<commit_message>
added readme; added some basic structure to presentation
</commit_message>
<xml_diff>
--- a/ex2/Exercise_2_ppt.pptx
+++ b/ex2/Exercise_2_ppt.pptx
@@ -7,6 +7,19 @@
   <p:sldIdLst>
     <p:sldId id="256" r:id="rId2"/>
     <p:sldId id="257" r:id="rId3"/>
+    <p:sldId id="260" r:id="rId4"/>
+    <p:sldId id="258" r:id="rId5"/>
+    <p:sldId id="259" r:id="rId6"/>
+    <p:sldId id="261" r:id="rId7"/>
+    <p:sldId id="264" r:id="rId8"/>
+    <p:sldId id="262" r:id="rId9"/>
+    <p:sldId id="263" r:id="rId10"/>
+    <p:sldId id="265" r:id="rId11"/>
+    <p:sldId id="266" r:id="rId12"/>
+    <p:sldId id="267" r:id="rId13"/>
+    <p:sldId id="268" r:id="rId14"/>
+    <p:sldId id="269" r:id="rId15"/>
+    <p:sldId id="270" r:id="rId16"/>
   </p:sldIdLst>
   <p:sldSz cx="12192000" cy="6858000"/>
   <p:notesSz cx="6858000" cy="9144000"/>
@@ -105,7 +118,196 @@
       </a:defRPr>
     </a:lvl9pPr>
   </p:defaultTextStyle>
+  <p:extLst>
+    <p:ext uri="{EFAFB233-063F-42B5-8137-9DF3F51BA10A}">
+      <p15:sldGuideLst xmlns:p15="http://schemas.microsoft.com/office/powerpoint/2012/main"/>
+    </p:ext>
+  </p:extLst>
 </p:presentation>
+</file>
+
+<file path=ppt/changesInfos/changesInfo1.xml><?xml version="1.0" encoding="utf-8"?>
+<pc:chgInfo xmlns:a="http://schemas.openxmlformats.org/drawingml/2006/main" xmlns:r="http://schemas.openxmlformats.org/officeDocument/2006/relationships" xmlns:ac="http://schemas.microsoft.com/office/drawing/2013/main/command" xmlns:pc="http://schemas.microsoft.com/office/powerpoint/2013/main/command">
+  <pc:docChgLst>
+    <pc:chgData name="Haubenburger, Gabriel" userId="d79be2aa-0303-4748-b5e6-c8202455e92e" providerId="ADAL" clId="{C41F04A2-1B58-4C51-987F-CBD3CF99D29E}"/>
+    <pc:docChg chg="addSld modSld sldOrd">
+      <pc:chgData name="Haubenburger, Gabriel" userId="d79be2aa-0303-4748-b5e6-c8202455e92e" providerId="ADAL" clId="{C41F04A2-1B58-4C51-987F-CBD3CF99D29E}" dt="2024-12-15T14:42:22.649" v="296" actId="20577"/>
+      <pc:docMkLst>
+        <pc:docMk/>
+      </pc:docMkLst>
+      <pc:sldChg chg="modSp mod">
+        <pc:chgData name="Haubenburger, Gabriel" userId="d79be2aa-0303-4748-b5e6-c8202455e92e" providerId="ADAL" clId="{C41F04A2-1B58-4C51-987F-CBD3CF99D29E}" dt="2024-12-15T14:36:35.033" v="20" actId="20577"/>
+        <pc:sldMkLst>
+          <pc:docMk/>
+          <pc:sldMk cId="3647451211" sldId="257"/>
+        </pc:sldMkLst>
+        <pc:spChg chg="mod">
+          <ac:chgData name="Haubenburger, Gabriel" userId="d79be2aa-0303-4748-b5e6-c8202455e92e" providerId="ADAL" clId="{C41F04A2-1B58-4C51-987F-CBD3CF99D29E}" dt="2024-12-15T14:36:35.033" v="20" actId="20577"/>
+          <ac:spMkLst>
+            <pc:docMk/>
+            <pc:sldMk cId="3647451211" sldId="257"/>
+            <ac:spMk id="2" creationId="{76FF67D3-B55B-1A2C-CABD-B97CE0F8F85D}"/>
+          </ac:spMkLst>
+        </pc:spChg>
+      </pc:sldChg>
+      <pc:sldChg chg="modSp new mod">
+        <pc:chgData name="Haubenburger, Gabriel" userId="d79be2aa-0303-4748-b5e6-c8202455e92e" providerId="ADAL" clId="{C41F04A2-1B58-4C51-987F-CBD3CF99D29E}" dt="2024-12-15T14:37:10.018" v="45" actId="20577"/>
+        <pc:sldMkLst>
+          <pc:docMk/>
+          <pc:sldMk cId="225849889" sldId="258"/>
+        </pc:sldMkLst>
+        <pc:spChg chg="mod">
+          <ac:chgData name="Haubenburger, Gabriel" userId="d79be2aa-0303-4748-b5e6-c8202455e92e" providerId="ADAL" clId="{C41F04A2-1B58-4C51-987F-CBD3CF99D29E}" dt="2024-12-15T14:37:10.018" v="45" actId="20577"/>
+          <ac:spMkLst>
+            <pc:docMk/>
+            <pc:sldMk cId="225849889" sldId="258"/>
+            <ac:spMk id="2" creationId="{D53941FA-7273-3406-419C-D52C9C290FFD}"/>
+          </ac:spMkLst>
+        </pc:spChg>
+      </pc:sldChg>
+      <pc:sldChg chg="modSp new mod">
+        <pc:chgData name="Haubenburger, Gabriel" userId="d79be2aa-0303-4748-b5e6-c8202455e92e" providerId="ADAL" clId="{C41F04A2-1B58-4C51-987F-CBD3CF99D29E}" dt="2024-12-15T14:37:17.361" v="68" actId="20577"/>
+        <pc:sldMkLst>
+          <pc:docMk/>
+          <pc:sldMk cId="4244075057" sldId="259"/>
+        </pc:sldMkLst>
+        <pc:spChg chg="mod">
+          <ac:chgData name="Haubenburger, Gabriel" userId="d79be2aa-0303-4748-b5e6-c8202455e92e" providerId="ADAL" clId="{C41F04A2-1B58-4C51-987F-CBD3CF99D29E}" dt="2024-12-15T14:37:17.361" v="68" actId="20577"/>
+          <ac:spMkLst>
+            <pc:docMk/>
+            <pc:sldMk cId="4244075057" sldId="259"/>
+            <ac:spMk id="2" creationId="{D00F6813-54FC-527F-C6A4-D8A65970CE8E}"/>
+          </ac:spMkLst>
+        </pc:spChg>
+      </pc:sldChg>
+      <pc:sldChg chg="modSp new mod ord">
+        <pc:chgData name="Haubenburger, Gabriel" userId="d79be2aa-0303-4748-b5e6-c8202455e92e" providerId="ADAL" clId="{C41F04A2-1B58-4C51-987F-CBD3CF99D29E}" dt="2024-12-15T14:37:35.113" v="83" actId="20577"/>
+        <pc:sldMkLst>
+          <pc:docMk/>
+          <pc:sldMk cId="156605029" sldId="260"/>
+        </pc:sldMkLst>
+        <pc:spChg chg="mod">
+          <ac:chgData name="Haubenburger, Gabriel" userId="d79be2aa-0303-4748-b5e6-c8202455e92e" providerId="ADAL" clId="{C41F04A2-1B58-4C51-987F-CBD3CF99D29E}" dt="2024-12-15T14:37:35.113" v="83" actId="20577"/>
+          <ac:spMkLst>
+            <pc:docMk/>
+            <pc:sldMk cId="156605029" sldId="260"/>
+            <ac:spMk id="2" creationId="{43E5E657-5791-8DDB-8C86-08F40B5DA77F}"/>
+          </ac:spMkLst>
+        </pc:spChg>
+      </pc:sldChg>
+      <pc:sldChg chg="modSp new mod">
+        <pc:chgData name="Haubenburger, Gabriel" userId="d79be2aa-0303-4748-b5e6-c8202455e92e" providerId="ADAL" clId="{C41F04A2-1B58-4C51-987F-CBD3CF99D29E}" dt="2024-12-15T14:38:36.441" v="116" actId="20577"/>
+        <pc:sldMkLst>
+          <pc:docMk/>
+          <pc:sldMk cId="2778680789" sldId="261"/>
+        </pc:sldMkLst>
+        <pc:spChg chg="mod">
+          <ac:chgData name="Haubenburger, Gabriel" userId="d79be2aa-0303-4748-b5e6-c8202455e92e" providerId="ADAL" clId="{C41F04A2-1B58-4C51-987F-CBD3CF99D29E}" dt="2024-12-15T14:38:36.441" v="116" actId="20577"/>
+          <ac:spMkLst>
+            <pc:docMk/>
+            <pc:sldMk cId="2778680789" sldId="261"/>
+            <ac:spMk id="2" creationId="{DC99B76B-690A-D473-6489-8EBA89769C27}"/>
+          </ac:spMkLst>
+        </pc:spChg>
+      </pc:sldChg>
+      <pc:sldChg chg="modSp new mod">
+        <pc:chgData name="Haubenburger, Gabriel" userId="d79be2aa-0303-4748-b5e6-c8202455e92e" providerId="ADAL" clId="{C41F04A2-1B58-4C51-987F-CBD3CF99D29E}" dt="2024-12-15T14:41:34.945" v="286" actId="20577"/>
+        <pc:sldMkLst>
+          <pc:docMk/>
+          <pc:sldMk cId="2625827110" sldId="262"/>
+        </pc:sldMkLst>
+        <pc:spChg chg="mod">
+          <ac:chgData name="Haubenburger, Gabriel" userId="d79be2aa-0303-4748-b5e6-c8202455e92e" providerId="ADAL" clId="{C41F04A2-1B58-4C51-987F-CBD3CF99D29E}" dt="2024-12-15T14:41:34.945" v="286" actId="20577"/>
+          <ac:spMkLst>
+            <pc:docMk/>
+            <pc:sldMk cId="2625827110" sldId="262"/>
+            <ac:spMk id="2" creationId="{ACF1EA68-71E2-CFFF-77D9-9092BD40F57C}"/>
+          </ac:spMkLst>
+        </pc:spChg>
+      </pc:sldChg>
+      <pc:sldChg chg="modSp new mod">
+        <pc:chgData name="Haubenburger, Gabriel" userId="d79be2aa-0303-4748-b5e6-c8202455e92e" providerId="ADAL" clId="{C41F04A2-1B58-4C51-987F-CBD3CF99D29E}" dt="2024-12-15T14:39:29.385" v="193" actId="20577"/>
+        <pc:sldMkLst>
+          <pc:docMk/>
+          <pc:sldMk cId="271810423" sldId="263"/>
+        </pc:sldMkLst>
+        <pc:spChg chg="mod">
+          <ac:chgData name="Haubenburger, Gabriel" userId="d79be2aa-0303-4748-b5e6-c8202455e92e" providerId="ADAL" clId="{C41F04A2-1B58-4C51-987F-CBD3CF99D29E}" dt="2024-12-15T14:39:29.385" v="193" actId="20577"/>
+          <ac:spMkLst>
+            <pc:docMk/>
+            <pc:sldMk cId="271810423" sldId="263"/>
+            <ac:spMk id="2" creationId="{2D8F8289-407F-B67A-7169-6CF13174AF57}"/>
+          </ac:spMkLst>
+        </pc:spChg>
+      </pc:sldChg>
+      <pc:sldChg chg="modSp new mod ord">
+        <pc:chgData name="Haubenburger, Gabriel" userId="d79be2aa-0303-4748-b5e6-c8202455e92e" providerId="ADAL" clId="{C41F04A2-1B58-4C51-987F-CBD3CF99D29E}" dt="2024-12-15T14:41:25.913" v="264" actId="20577"/>
+        <pc:sldMkLst>
+          <pc:docMk/>
+          <pc:sldMk cId="1949933045" sldId="264"/>
+        </pc:sldMkLst>
+        <pc:spChg chg="mod">
+          <ac:chgData name="Haubenburger, Gabriel" userId="d79be2aa-0303-4748-b5e6-c8202455e92e" providerId="ADAL" clId="{C41F04A2-1B58-4C51-987F-CBD3CF99D29E}" dt="2024-12-15T14:41:25.913" v="264" actId="20577"/>
+          <ac:spMkLst>
+            <pc:docMk/>
+            <pc:sldMk cId="1949933045" sldId="264"/>
+            <ac:spMk id="2" creationId="{44507AA4-E8F1-18B6-384D-A7EAF861E7A6}"/>
+          </ac:spMkLst>
+        </pc:spChg>
+      </pc:sldChg>
+      <pc:sldChg chg="modSp new mod">
+        <pc:chgData name="Haubenburger, Gabriel" userId="d79be2aa-0303-4748-b5e6-c8202455e92e" providerId="ADAL" clId="{C41F04A2-1B58-4C51-987F-CBD3CF99D29E}" dt="2024-12-15T14:42:22.649" v="296" actId="20577"/>
+        <pc:sldMkLst>
+          <pc:docMk/>
+          <pc:sldMk cId="3637246051" sldId="265"/>
+        </pc:sldMkLst>
+        <pc:spChg chg="mod">
+          <ac:chgData name="Haubenburger, Gabriel" userId="d79be2aa-0303-4748-b5e6-c8202455e92e" providerId="ADAL" clId="{C41F04A2-1B58-4C51-987F-CBD3CF99D29E}" dt="2024-12-15T14:42:22.649" v="296" actId="20577"/>
+          <ac:spMkLst>
+            <pc:docMk/>
+            <pc:sldMk cId="3637246051" sldId="265"/>
+            <ac:spMk id="2" creationId="{4D54CD70-A7C7-B159-DB36-DD35BB897E4A}"/>
+          </ac:spMkLst>
+        </pc:spChg>
+      </pc:sldChg>
+      <pc:sldChg chg="new">
+        <pc:chgData name="Haubenburger, Gabriel" userId="d79be2aa-0303-4748-b5e6-c8202455e92e" providerId="ADAL" clId="{C41F04A2-1B58-4C51-987F-CBD3CF99D29E}" dt="2024-12-15T14:36:14.718" v="8" actId="680"/>
+        <pc:sldMkLst>
+          <pc:docMk/>
+          <pc:sldMk cId="1764173400" sldId="266"/>
+        </pc:sldMkLst>
+      </pc:sldChg>
+      <pc:sldChg chg="new">
+        <pc:chgData name="Haubenburger, Gabriel" userId="d79be2aa-0303-4748-b5e6-c8202455e92e" providerId="ADAL" clId="{C41F04A2-1B58-4C51-987F-CBD3CF99D29E}" dt="2024-12-15T14:36:15.125" v="9" actId="680"/>
+        <pc:sldMkLst>
+          <pc:docMk/>
+          <pc:sldMk cId="1936087243" sldId="267"/>
+        </pc:sldMkLst>
+      </pc:sldChg>
+      <pc:sldChg chg="new">
+        <pc:chgData name="Haubenburger, Gabriel" userId="d79be2aa-0303-4748-b5e6-c8202455e92e" providerId="ADAL" clId="{C41F04A2-1B58-4C51-987F-CBD3CF99D29E}" dt="2024-12-15T14:36:15.478" v="10" actId="680"/>
+        <pc:sldMkLst>
+          <pc:docMk/>
+          <pc:sldMk cId="868701430" sldId="268"/>
+        </pc:sldMkLst>
+      </pc:sldChg>
+      <pc:sldChg chg="new">
+        <pc:chgData name="Haubenburger, Gabriel" userId="d79be2aa-0303-4748-b5e6-c8202455e92e" providerId="ADAL" clId="{C41F04A2-1B58-4C51-987F-CBD3CF99D29E}" dt="2024-12-15T14:36:15.862" v="11" actId="680"/>
+        <pc:sldMkLst>
+          <pc:docMk/>
+          <pc:sldMk cId="2731784210" sldId="269"/>
+        </pc:sldMkLst>
+      </pc:sldChg>
+      <pc:sldChg chg="new">
+        <pc:chgData name="Haubenburger, Gabriel" userId="d79be2aa-0303-4748-b5e6-c8202455e92e" providerId="ADAL" clId="{C41F04A2-1B58-4C51-987F-CBD3CF99D29E}" dt="2024-12-15T14:36:16.829" v="12" actId="680"/>
+        <pc:sldMkLst>
+          <pc:docMk/>
+          <pc:sldMk cId="2077306566" sldId="270"/>
+        </pc:sldMkLst>
+      </pc:sldChg>
+    </pc:docChg>
+  </pc:docChgLst>
+</pc:chgInfo>
 </file>
 
 <file path=ppt/slideLayouts/slideLayout1.xml><?xml version="1.0" encoding="utf-8"?>
@@ -6364,6 +6566,490 @@
 </p:sld>
 </file>
 
+<file path=ppt/slides/slide10.xml><?xml version="1.0" encoding="utf-8"?>
+<p:sld xmlns:a="http://schemas.openxmlformats.org/drawingml/2006/main" xmlns:r="http://schemas.openxmlformats.org/officeDocument/2006/relationships" xmlns:p="http://schemas.openxmlformats.org/presentationml/2006/main">
+  <p:cSld>
+    <p:spTree>
+      <p:nvGrpSpPr>
+        <p:cNvPr id="1" name=""/>
+        <p:cNvGrpSpPr/>
+        <p:nvPr/>
+      </p:nvGrpSpPr>
+      <p:grpSpPr>
+        <a:xfrm>
+          <a:off x="0" y="0"/>
+          <a:ext cx="0" cy="0"/>
+          <a:chOff x="0" y="0"/>
+          <a:chExt cx="0" cy="0"/>
+        </a:xfrm>
+      </p:grpSpPr>
+      <p:sp>
+        <p:nvSpPr>
+          <p:cNvPr id="2" name="Title 1">
+            <a:extLst>
+              <a:ext uri="{FF2B5EF4-FFF2-40B4-BE49-F238E27FC236}">
+                <a16:creationId xmlns:a16="http://schemas.microsoft.com/office/drawing/2014/main" id="{4D54CD70-A7C7-B159-DB36-DD35BB897E4A}"/>
+              </a:ext>
+            </a:extLst>
+          </p:cNvPr>
+          <p:cNvSpPr>
+            <a:spLocks noGrp="1"/>
+          </p:cNvSpPr>
+          <p:nvPr>
+            <p:ph type="title"/>
+          </p:nvPr>
+        </p:nvSpPr>
+        <p:spPr/>
+        <p:txBody>
+          <a:bodyPr/>
+          <a:lstStyle/>
+          <a:p>
+            <a:r>
+              <a:rPr lang="de-DE" dirty="0" err="1"/>
+              <a:t>Conclusion</a:t>
+            </a:r>
+            <a:endParaRPr lang="de-AT" dirty="0"/>
+          </a:p>
+        </p:txBody>
+      </p:sp>
+      <p:sp>
+        <p:nvSpPr>
+          <p:cNvPr id="3" name="Content Placeholder 2">
+            <a:extLst>
+              <a:ext uri="{FF2B5EF4-FFF2-40B4-BE49-F238E27FC236}">
+                <a16:creationId xmlns:a16="http://schemas.microsoft.com/office/drawing/2014/main" id="{84CFF438-856F-957D-7156-C2F5B4AFDC20}"/>
+              </a:ext>
+            </a:extLst>
+          </p:cNvPr>
+          <p:cNvSpPr>
+            <a:spLocks noGrp="1"/>
+          </p:cNvSpPr>
+          <p:nvPr>
+            <p:ph idx="1"/>
+          </p:nvPr>
+        </p:nvSpPr>
+        <p:spPr/>
+        <p:txBody>
+          <a:bodyPr/>
+          <a:lstStyle/>
+          <a:p>
+            <a:endParaRPr lang="de-AT"/>
+          </a:p>
+        </p:txBody>
+      </p:sp>
+    </p:spTree>
+    <p:extLst>
+      <p:ext uri="{BB962C8B-B14F-4D97-AF65-F5344CB8AC3E}">
+        <p14:creationId xmlns:p14="http://schemas.microsoft.com/office/powerpoint/2010/main" val="3637246051"/>
+      </p:ext>
+    </p:extLst>
+  </p:cSld>
+  <p:clrMapOvr>
+    <a:masterClrMapping/>
+  </p:clrMapOvr>
+</p:sld>
+</file>
+
+<file path=ppt/slides/slide11.xml><?xml version="1.0" encoding="utf-8"?>
+<p:sld xmlns:a="http://schemas.openxmlformats.org/drawingml/2006/main" xmlns:r="http://schemas.openxmlformats.org/officeDocument/2006/relationships" xmlns:p="http://schemas.openxmlformats.org/presentationml/2006/main">
+  <p:cSld>
+    <p:spTree>
+      <p:nvGrpSpPr>
+        <p:cNvPr id="1" name=""/>
+        <p:cNvGrpSpPr/>
+        <p:nvPr/>
+      </p:nvGrpSpPr>
+      <p:grpSpPr>
+        <a:xfrm>
+          <a:off x="0" y="0"/>
+          <a:ext cx="0" cy="0"/>
+          <a:chOff x="0" y="0"/>
+          <a:chExt cx="0" cy="0"/>
+        </a:xfrm>
+      </p:grpSpPr>
+      <p:sp>
+        <p:nvSpPr>
+          <p:cNvPr id="2" name="Title 1">
+            <a:extLst>
+              <a:ext uri="{FF2B5EF4-FFF2-40B4-BE49-F238E27FC236}">
+                <a16:creationId xmlns:a16="http://schemas.microsoft.com/office/drawing/2014/main" id="{F2828560-3281-7AA8-FACE-BE9A95FCF4EE}"/>
+              </a:ext>
+            </a:extLst>
+          </p:cNvPr>
+          <p:cNvSpPr>
+            <a:spLocks noGrp="1"/>
+          </p:cNvSpPr>
+          <p:nvPr>
+            <p:ph type="title"/>
+          </p:nvPr>
+        </p:nvSpPr>
+        <p:spPr/>
+        <p:txBody>
+          <a:bodyPr/>
+          <a:lstStyle/>
+          <a:p>
+            <a:endParaRPr lang="de-AT"/>
+          </a:p>
+        </p:txBody>
+      </p:sp>
+      <p:sp>
+        <p:nvSpPr>
+          <p:cNvPr id="3" name="Content Placeholder 2">
+            <a:extLst>
+              <a:ext uri="{FF2B5EF4-FFF2-40B4-BE49-F238E27FC236}">
+                <a16:creationId xmlns:a16="http://schemas.microsoft.com/office/drawing/2014/main" id="{C2C34ABA-A410-7029-1000-0F296A1EC0E5}"/>
+              </a:ext>
+            </a:extLst>
+          </p:cNvPr>
+          <p:cNvSpPr>
+            <a:spLocks noGrp="1"/>
+          </p:cNvSpPr>
+          <p:nvPr>
+            <p:ph idx="1"/>
+          </p:nvPr>
+        </p:nvSpPr>
+        <p:spPr/>
+        <p:txBody>
+          <a:bodyPr/>
+          <a:lstStyle/>
+          <a:p>
+            <a:endParaRPr lang="de-AT"/>
+          </a:p>
+        </p:txBody>
+      </p:sp>
+    </p:spTree>
+    <p:extLst>
+      <p:ext uri="{BB962C8B-B14F-4D97-AF65-F5344CB8AC3E}">
+        <p14:creationId xmlns:p14="http://schemas.microsoft.com/office/powerpoint/2010/main" val="1764173400"/>
+      </p:ext>
+    </p:extLst>
+  </p:cSld>
+  <p:clrMapOvr>
+    <a:masterClrMapping/>
+  </p:clrMapOvr>
+</p:sld>
+</file>
+
+<file path=ppt/slides/slide12.xml><?xml version="1.0" encoding="utf-8"?>
+<p:sld xmlns:a="http://schemas.openxmlformats.org/drawingml/2006/main" xmlns:r="http://schemas.openxmlformats.org/officeDocument/2006/relationships" xmlns:p="http://schemas.openxmlformats.org/presentationml/2006/main">
+  <p:cSld>
+    <p:spTree>
+      <p:nvGrpSpPr>
+        <p:cNvPr id="1" name=""/>
+        <p:cNvGrpSpPr/>
+        <p:nvPr/>
+      </p:nvGrpSpPr>
+      <p:grpSpPr>
+        <a:xfrm>
+          <a:off x="0" y="0"/>
+          <a:ext cx="0" cy="0"/>
+          <a:chOff x="0" y="0"/>
+          <a:chExt cx="0" cy="0"/>
+        </a:xfrm>
+      </p:grpSpPr>
+      <p:sp>
+        <p:nvSpPr>
+          <p:cNvPr id="2" name="Title 1">
+            <a:extLst>
+              <a:ext uri="{FF2B5EF4-FFF2-40B4-BE49-F238E27FC236}">
+                <a16:creationId xmlns:a16="http://schemas.microsoft.com/office/drawing/2014/main" id="{C9BDEEB6-777B-7139-49B8-78BA05B48F84}"/>
+              </a:ext>
+            </a:extLst>
+          </p:cNvPr>
+          <p:cNvSpPr>
+            <a:spLocks noGrp="1"/>
+          </p:cNvSpPr>
+          <p:nvPr>
+            <p:ph type="title"/>
+          </p:nvPr>
+        </p:nvSpPr>
+        <p:spPr/>
+        <p:txBody>
+          <a:bodyPr/>
+          <a:lstStyle/>
+          <a:p>
+            <a:endParaRPr lang="de-AT"/>
+          </a:p>
+        </p:txBody>
+      </p:sp>
+      <p:sp>
+        <p:nvSpPr>
+          <p:cNvPr id="3" name="Content Placeholder 2">
+            <a:extLst>
+              <a:ext uri="{FF2B5EF4-FFF2-40B4-BE49-F238E27FC236}">
+                <a16:creationId xmlns:a16="http://schemas.microsoft.com/office/drawing/2014/main" id="{3244DD77-BA9C-4A0C-D04C-7099FEF90762}"/>
+              </a:ext>
+            </a:extLst>
+          </p:cNvPr>
+          <p:cNvSpPr>
+            <a:spLocks noGrp="1"/>
+          </p:cNvSpPr>
+          <p:nvPr>
+            <p:ph idx="1"/>
+          </p:nvPr>
+        </p:nvSpPr>
+        <p:spPr/>
+        <p:txBody>
+          <a:bodyPr/>
+          <a:lstStyle/>
+          <a:p>
+            <a:endParaRPr lang="de-AT"/>
+          </a:p>
+        </p:txBody>
+      </p:sp>
+    </p:spTree>
+    <p:extLst>
+      <p:ext uri="{BB962C8B-B14F-4D97-AF65-F5344CB8AC3E}">
+        <p14:creationId xmlns:p14="http://schemas.microsoft.com/office/powerpoint/2010/main" val="1936087243"/>
+      </p:ext>
+    </p:extLst>
+  </p:cSld>
+  <p:clrMapOvr>
+    <a:masterClrMapping/>
+  </p:clrMapOvr>
+</p:sld>
+</file>
+
+<file path=ppt/slides/slide13.xml><?xml version="1.0" encoding="utf-8"?>
+<p:sld xmlns:a="http://schemas.openxmlformats.org/drawingml/2006/main" xmlns:r="http://schemas.openxmlformats.org/officeDocument/2006/relationships" xmlns:p="http://schemas.openxmlformats.org/presentationml/2006/main">
+  <p:cSld>
+    <p:spTree>
+      <p:nvGrpSpPr>
+        <p:cNvPr id="1" name=""/>
+        <p:cNvGrpSpPr/>
+        <p:nvPr/>
+      </p:nvGrpSpPr>
+      <p:grpSpPr>
+        <a:xfrm>
+          <a:off x="0" y="0"/>
+          <a:ext cx="0" cy="0"/>
+          <a:chOff x="0" y="0"/>
+          <a:chExt cx="0" cy="0"/>
+        </a:xfrm>
+      </p:grpSpPr>
+      <p:sp>
+        <p:nvSpPr>
+          <p:cNvPr id="2" name="Title 1">
+            <a:extLst>
+              <a:ext uri="{FF2B5EF4-FFF2-40B4-BE49-F238E27FC236}">
+                <a16:creationId xmlns:a16="http://schemas.microsoft.com/office/drawing/2014/main" id="{B8031770-91DB-E235-9154-D52999D90641}"/>
+              </a:ext>
+            </a:extLst>
+          </p:cNvPr>
+          <p:cNvSpPr>
+            <a:spLocks noGrp="1"/>
+          </p:cNvSpPr>
+          <p:nvPr>
+            <p:ph type="title"/>
+          </p:nvPr>
+        </p:nvSpPr>
+        <p:spPr/>
+        <p:txBody>
+          <a:bodyPr/>
+          <a:lstStyle/>
+          <a:p>
+            <a:endParaRPr lang="de-AT"/>
+          </a:p>
+        </p:txBody>
+      </p:sp>
+      <p:sp>
+        <p:nvSpPr>
+          <p:cNvPr id="3" name="Content Placeholder 2">
+            <a:extLst>
+              <a:ext uri="{FF2B5EF4-FFF2-40B4-BE49-F238E27FC236}">
+                <a16:creationId xmlns:a16="http://schemas.microsoft.com/office/drawing/2014/main" id="{77AC39F9-30E5-45C4-7885-2A40A50E6108}"/>
+              </a:ext>
+            </a:extLst>
+          </p:cNvPr>
+          <p:cNvSpPr>
+            <a:spLocks noGrp="1"/>
+          </p:cNvSpPr>
+          <p:nvPr>
+            <p:ph idx="1"/>
+          </p:nvPr>
+        </p:nvSpPr>
+        <p:spPr/>
+        <p:txBody>
+          <a:bodyPr/>
+          <a:lstStyle/>
+          <a:p>
+            <a:endParaRPr lang="de-AT"/>
+          </a:p>
+        </p:txBody>
+      </p:sp>
+    </p:spTree>
+    <p:extLst>
+      <p:ext uri="{BB962C8B-B14F-4D97-AF65-F5344CB8AC3E}">
+        <p14:creationId xmlns:p14="http://schemas.microsoft.com/office/powerpoint/2010/main" val="868701430"/>
+      </p:ext>
+    </p:extLst>
+  </p:cSld>
+  <p:clrMapOvr>
+    <a:masterClrMapping/>
+  </p:clrMapOvr>
+</p:sld>
+</file>
+
+<file path=ppt/slides/slide14.xml><?xml version="1.0" encoding="utf-8"?>
+<p:sld xmlns:a="http://schemas.openxmlformats.org/drawingml/2006/main" xmlns:r="http://schemas.openxmlformats.org/officeDocument/2006/relationships" xmlns:p="http://schemas.openxmlformats.org/presentationml/2006/main">
+  <p:cSld>
+    <p:spTree>
+      <p:nvGrpSpPr>
+        <p:cNvPr id="1" name=""/>
+        <p:cNvGrpSpPr/>
+        <p:nvPr/>
+      </p:nvGrpSpPr>
+      <p:grpSpPr>
+        <a:xfrm>
+          <a:off x="0" y="0"/>
+          <a:ext cx="0" cy="0"/>
+          <a:chOff x="0" y="0"/>
+          <a:chExt cx="0" cy="0"/>
+        </a:xfrm>
+      </p:grpSpPr>
+      <p:sp>
+        <p:nvSpPr>
+          <p:cNvPr id="2" name="Title 1">
+            <a:extLst>
+              <a:ext uri="{FF2B5EF4-FFF2-40B4-BE49-F238E27FC236}">
+                <a16:creationId xmlns:a16="http://schemas.microsoft.com/office/drawing/2014/main" id="{9C3C3A8D-1E82-EA30-3D13-AFF5A3349BE0}"/>
+              </a:ext>
+            </a:extLst>
+          </p:cNvPr>
+          <p:cNvSpPr>
+            <a:spLocks noGrp="1"/>
+          </p:cNvSpPr>
+          <p:nvPr>
+            <p:ph type="title"/>
+          </p:nvPr>
+        </p:nvSpPr>
+        <p:spPr/>
+        <p:txBody>
+          <a:bodyPr/>
+          <a:lstStyle/>
+          <a:p>
+            <a:endParaRPr lang="de-AT"/>
+          </a:p>
+        </p:txBody>
+      </p:sp>
+      <p:sp>
+        <p:nvSpPr>
+          <p:cNvPr id="3" name="Content Placeholder 2">
+            <a:extLst>
+              <a:ext uri="{FF2B5EF4-FFF2-40B4-BE49-F238E27FC236}">
+                <a16:creationId xmlns:a16="http://schemas.microsoft.com/office/drawing/2014/main" id="{B0FC1963-7441-5AFB-0B26-C4C1AB405478}"/>
+              </a:ext>
+            </a:extLst>
+          </p:cNvPr>
+          <p:cNvSpPr>
+            <a:spLocks noGrp="1"/>
+          </p:cNvSpPr>
+          <p:nvPr>
+            <p:ph idx="1"/>
+          </p:nvPr>
+        </p:nvSpPr>
+        <p:spPr/>
+        <p:txBody>
+          <a:bodyPr/>
+          <a:lstStyle/>
+          <a:p>
+            <a:endParaRPr lang="de-AT"/>
+          </a:p>
+        </p:txBody>
+      </p:sp>
+    </p:spTree>
+    <p:extLst>
+      <p:ext uri="{BB962C8B-B14F-4D97-AF65-F5344CB8AC3E}">
+        <p14:creationId xmlns:p14="http://schemas.microsoft.com/office/powerpoint/2010/main" val="2731784210"/>
+      </p:ext>
+    </p:extLst>
+  </p:cSld>
+  <p:clrMapOvr>
+    <a:masterClrMapping/>
+  </p:clrMapOvr>
+</p:sld>
+</file>
+
+<file path=ppt/slides/slide15.xml><?xml version="1.0" encoding="utf-8"?>
+<p:sld xmlns:a="http://schemas.openxmlformats.org/drawingml/2006/main" xmlns:r="http://schemas.openxmlformats.org/officeDocument/2006/relationships" xmlns:p="http://schemas.openxmlformats.org/presentationml/2006/main">
+  <p:cSld>
+    <p:spTree>
+      <p:nvGrpSpPr>
+        <p:cNvPr id="1" name=""/>
+        <p:cNvGrpSpPr/>
+        <p:nvPr/>
+      </p:nvGrpSpPr>
+      <p:grpSpPr>
+        <a:xfrm>
+          <a:off x="0" y="0"/>
+          <a:ext cx="0" cy="0"/>
+          <a:chOff x="0" y="0"/>
+          <a:chExt cx="0" cy="0"/>
+        </a:xfrm>
+      </p:grpSpPr>
+      <p:sp>
+        <p:nvSpPr>
+          <p:cNvPr id="2" name="Title 1">
+            <a:extLst>
+              <a:ext uri="{FF2B5EF4-FFF2-40B4-BE49-F238E27FC236}">
+                <a16:creationId xmlns:a16="http://schemas.microsoft.com/office/drawing/2014/main" id="{818E5137-9F21-7374-8AF7-83B95450444B}"/>
+              </a:ext>
+            </a:extLst>
+          </p:cNvPr>
+          <p:cNvSpPr>
+            <a:spLocks noGrp="1"/>
+          </p:cNvSpPr>
+          <p:nvPr>
+            <p:ph type="title"/>
+          </p:nvPr>
+        </p:nvSpPr>
+        <p:spPr/>
+        <p:txBody>
+          <a:bodyPr/>
+          <a:lstStyle/>
+          <a:p>
+            <a:endParaRPr lang="de-AT"/>
+          </a:p>
+        </p:txBody>
+      </p:sp>
+      <p:sp>
+        <p:nvSpPr>
+          <p:cNvPr id="3" name="Content Placeholder 2">
+            <a:extLst>
+              <a:ext uri="{FF2B5EF4-FFF2-40B4-BE49-F238E27FC236}">
+                <a16:creationId xmlns:a16="http://schemas.microsoft.com/office/drawing/2014/main" id="{504F3F50-B242-B55C-903B-0FE55DB38A00}"/>
+              </a:ext>
+            </a:extLst>
+          </p:cNvPr>
+          <p:cNvSpPr>
+            <a:spLocks noGrp="1"/>
+          </p:cNvSpPr>
+          <p:nvPr>
+            <p:ph idx="1"/>
+          </p:nvPr>
+        </p:nvSpPr>
+        <p:spPr/>
+        <p:txBody>
+          <a:bodyPr/>
+          <a:lstStyle/>
+          <a:p>
+            <a:endParaRPr lang="de-AT"/>
+          </a:p>
+        </p:txBody>
+      </p:sp>
+    </p:spTree>
+    <p:extLst>
+      <p:ext uri="{BB962C8B-B14F-4D97-AF65-F5344CB8AC3E}">
+        <p14:creationId xmlns:p14="http://schemas.microsoft.com/office/powerpoint/2010/main" val="2077306566"/>
+      </p:ext>
+    </p:extLst>
+  </p:cSld>
+  <p:clrMapOvr>
+    <a:masterClrMapping/>
+  </p:clrMapOvr>
+</p:sld>
+</file>
+
 <file path=ppt/slides/slide2.xml><?xml version="1.0" encoding="utf-8"?>
 <p:sld xmlns:a="http://schemas.openxmlformats.org/drawingml/2006/main" xmlns:r="http://schemas.openxmlformats.org/officeDocument/2006/relationships" xmlns:p="http://schemas.openxmlformats.org/presentationml/2006/main">
   <p:cSld>
@@ -6402,7 +7088,10 @@
           <a:bodyPr/>
           <a:lstStyle/>
           <a:p>
-            <a:endParaRPr lang="en-IN"/>
+            <a:r>
+              <a:rPr lang="en-IN" dirty="0"/>
+              <a:t>Datasets</a:t>
+            </a:r>
           </a:p>
         </p:txBody>
       </p:sp>
@@ -6435,6 +7124,694 @@
     <p:extLst>
       <p:ext uri="{BB962C8B-B14F-4D97-AF65-F5344CB8AC3E}">
         <p14:creationId xmlns:p14="http://schemas.microsoft.com/office/powerpoint/2010/main" val="3647451211"/>
+      </p:ext>
+    </p:extLst>
+  </p:cSld>
+  <p:clrMapOvr>
+    <a:masterClrMapping/>
+  </p:clrMapOvr>
+</p:sld>
+</file>
+
+<file path=ppt/slides/slide3.xml><?xml version="1.0" encoding="utf-8"?>
+<p:sld xmlns:a="http://schemas.openxmlformats.org/drawingml/2006/main" xmlns:r="http://schemas.openxmlformats.org/officeDocument/2006/relationships" xmlns:p="http://schemas.openxmlformats.org/presentationml/2006/main">
+  <p:cSld>
+    <p:spTree>
+      <p:nvGrpSpPr>
+        <p:cNvPr id="1" name=""/>
+        <p:cNvGrpSpPr/>
+        <p:nvPr/>
+      </p:nvGrpSpPr>
+      <p:grpSpPr>
+        <a:xfrm>
+          <a:off x="0" y="0"/>
+          <a:ext cx="0" cy="0"/>
+          <a:chOff x="0" y="0"/>
+          <a:chExt cx="0" cy="0"/>
+        </a:xfrm>
+      </p:grpSpPr>
+      <p:sp>
+        <p:nvSpPr>
+          <p:cNvPr id="2" name="Title 1">
+            <a:extLst>
+              <a:ext uri="{FF2B5EF4-FFF2-40B4-BE49-F238E27FC236}">
+                <a16:creationId xmlns:a16="http://schemas.microsoft.com/office/drawing/2014/main" id="{43E5E657-5791-8DDB-8C86-08F40B5DA77F}"/>
+              </a:ext>
+            </a:extLst>
+          </p:cNvPr>
+          <p:cNvSpPr>
+            <a:spLocks noGrp="1"/>
+          </p:cNvSpPr>
+          <p:nvPr>
+            <p:ph type="title"/>
+          </p:nvPr>
+        </p:nvSpPr>
+        <p:spPr/>
+        <p:txBody>
+          <a:bodyPr/>
+          <a:lstStyle/>
+          <a:p>
+            <a:r>
+              <a:rPr lang="de-DE" dirty="0" err="1"/>
+              <a:t>Preprocessing</a:t>
+            </a:r>
+            <a:endParaRPr lang="de-AT" dirty="0"/>
+          </a:p>
+        </p:txBody>
+      </p:sp>
+      <p:sp>
+        <p:nvSpPr>
+          <p:cNvPr id="3" name="Content Placeholder 2">
+            <a:extLst>
+              <a:ext uri="{FF2B5EF4-FFF2-40B4-BE49-F238E27FC236}">
+                <a16:creationId xmlns:a16="http://schemas.microsoft.com/office/drawing/2014/main" id="{FFBFFA5E-236F-3279-8F0F-D69DEC44B6B0}"/>
+              </a:ext>
+            </a:extLst>
+          </p:cNvPr>
+          <p:cNvSpPr>
+            <a:spLocks noGrp="1"/>
+          </p:cNvSpPr>
+          <p:nvPr>
+            <p:ph idx="1"/>
+          </p:nvPr>
+        </p:nvSpPr>
+        <p:spPr/>
+        <p:txBody>
+          <a:bodyPr/>
+          <a:lstStyle/>
+          <a:p>
+            <a:endParaRPr lang="de-AT"/>
+          </a:p>
+        </p:txBody>
+      </p:sp>
+    </p:spTree>
+    <p:extLst>
+      <p:ext uri="{BB962C8B-B14F-4D97-AF65-F5344CB8AC3E}">
+        <p14:creationId xmlns:p14="http://schemas.microsoft.com/office/powerpoint/2010/main" val="156605029"/>
+      </p:ext>
+    </p:extLst>
+  </p:cSld>
+  <p:clrMapOvr>
+    <a:masterClrMapping/>
+  </p:clrMapOvr>
+</p:sld>
+</file>
+
+<file path=ppt/slides/slide4.xml><?xml version="1.0" encoding="utf-8"?>
+<p:sld xmlns:a="http://schemas.openxmlformats.org/drawingml/2006/main" xmlns:r="http://schemas.openxmlformats.org/officeDocument/2006/relationships" xmlns:p="http://schemas.openxmlformats.org/presentationml/2006/main">
+  <p:cSld>
+    <p:spTree>
+      <p:nvGrpSpPr>
+        <p:cNvPr id="1" name=""/>
+        <p:cNvGrpSpPr/>
+        <p:nvPr/>
+      </p:nvGrpSpPr>
+      <p:grpSpPr>
+        <a:xfrm>
+          <a:off x="0" y="0"/>
+          <a:ext cx="0" cy="0"/>
+          <a:chOff x="0" y="0"/>
+          <a:chExt cx="0" cy="0"/>
+        </a:xfrm>
+      </p:grpSpPr>
+      <p:sp>
+        <p:nvSpPr>
+          <p:cNvPr id="2" name="Title 1">
+            <a:extLst>
+              <a:ext uri="{FF2B5EF4-FFF2-40B4-BE49-F238E27FC236}">
+                <a16:creationId xmlns:a16="http://schemas.microsoft.com/office/drawing/2014/main" id="{D53941FA-7273-3406-419C-D52C9C290FFD}"/>
+              </a:ext>
+            </a:extLst>
+          </p:cNvPr>
+          <p:cNvSpPr>
+            <a:spLocks noGrp="1"/>
+          </p:cNvSpPr>
+          <p:nvPr>
+            <p:ph type="title"/>
+          </p:nvPr>
+        </p:nvSpPr>
+        <p:spPr/>
+        <p:txBody>
+          <a:bodyPr/>
+          <a:lstStyle/>
+          <a:p>
+            <a:r>
+              <a:rPr lang="de-DE" dirty="0" err="1"/>
+              <a:t>Decision</a:t>
+            </a:r>
+            <a:r>
+              <a:rPr lang="de-DE" dirty="0"/>
+              <a:t> </a:t>
+            </a:r>
+            <a:r>
+              <a:rPr lang="de-DE" dirty="0" err="1"/>
+              <a:t>Tree</a:t>
+            </a:r>
+            <a:r>
+              <a:rPr lang="de-DE" dirty="0"/>
+              <a:t> Regressor</a:t>
+            </a:r>
+            <a:endParaRPr lang="de-AT" dirty="0"/>
+          </a:p>
+        </p:txBody>
+      </p:sp>
+      <p:sp>
+        <p:nvSpPr>
+          <p:cNvPr id="3" name="Content Placeholder 2">
+            <a:extLst>
+              <a:ext uri="{FF2B5EF4-FFF2-40B4-BE49-F238E27FC236}">
+                <a16:creationId xmlns:a16="http://schemas.microsoft.com/office/drawing/2014/main" id="{BB3969EE-A50A-F4A8-56A6-D2F56033ADBA}"/>
+              </a:ext>
+            </a:extLst>
+          </p:cNvPr>
+          <p:cNvSpPr>
+            <a:spLocks noGrp="1"/>
+          </p:cNvSpPr>
+          <p:nvPr>
+            <p:ph idx="1"/>
+          </p:nvPr>
+        </p:nvSpPr>
+        <p:spPr/>
+        <p:txBody>
+          <a:bodyPr/>
+          <a:lstStyle/>
+          <a:p>
+            <a:endParaRPr lang="de-AT"/>
+          </a:p>
+        </p:txBody>
+      </p:sp>
+    </p:spTree>
+    <p:extLst>
+      <p:ext uri="{BB962C8B-B14F-4D97-AF65-F5344CB8AC3E}">
+        <p14:creationId xmlns:p14="http://schemas.microsoft.com/office/powerpoint/2010/main" val="225849889"/>
+      </p:ext>
+    </p:extLst>
+  </p:cSld>
+  <p:clrMapOvr>
+    <a:masterClrMapping/>
+  </p:clrMapOvr>
+</p:sld>
+</file>
+
+<file path=ppt/slides/slide5.xml><?xml version="1.0" encoding="utf-8"?>
+<p:sld xmlns:a="http://schemas.openxmlformats.org/drawingml/2006/main" xmlns:r="http://schemas.openxmlformats.org/officeDocument/2006/relationships" xmlns:p="http://schemas.openxmlformats.org/presentationml/2006/main">
+  <p:cSld>
+    <p:spTree>
+      <p:nvGrpSpPr>
+        <p:cNvPr id="1" name=""/>
+        <p:cNvGrpSpPr/>
+        <p:nvPr/>
+      </p:nvGrpSpPr>
+      <p:grpSpPr>
+        <a:xfrm>
+          <a:off x="0" y="0"/>
+          <a:ext cx="0" cy="0"/>
+          <a:chOff x="0" y="0"/>
+          <a:chExt cx="0" cy="0"/>
+        </a:xfrm>
+      </p:grpSpPr>
+      <p:sp>
+        <p:nvSpPr>
+          <p:cNvPr id="2" name="Title 1">
+            <a:extLst>
+              <a:ext uri="{FF2B5EF4-FFF2-40B4-BE49-F238E27FC236}">
+                <a16:creationId xmlns:a16="http://schemas.microsoft.com/office/drawing/2014/main" id="{D00F6813-54FC-527F-C6A4-D8A65970CE8E}"/>
+              </a:ext>
+            </a:extLst>
+          </p:cNvPr>
+          <p:cNvSpPr>
+            <a:spLocks noGrp="1"/>
+          </p:cNvSpPr>
+          <p:nvPr>
+            <p:ph type="title"/>
+          </p:nvPr>
+        </p:nvSpPr>
+        <p:spPr/>
+        <p:txBody>
+          <a:bodyPr/>
+          <a:lstStyle/>
+          <a:p>
+            <a:r>
+              <a:rPr lang="de-DE" dirty="0"/>
+              <a:t>Random Forest Regressor</a:t>
+            </a:r>
+            <a:endParaRPr lang="de-AT" dirty="0"/>
+          </a:p>
+        </p:txBody>
+      </p:sp>
+      <p:sp>
+        <p:nvSpPr>
+          <p:cNvPr id="3" name="Content Placeholder 2">
+            <a:extLst>
+              <a:ext uri="{FF2B5EF4-FFF2-40B4-BE49-F238E27FC236}">
+                <a16:creationId xmlns:a16="http://schemas.microsoft.com/office/drawing/2014/main" id="{BC38231A-ECB4-0153-0411-F74632AD3135}"/>
+              </a:ext>
+            </a:extLst>
+          </p:cNvPr>
+          <p:cNvSpPr>
+            <a:spLocks noGrp="1"/>
+          </p:cNvSpPr>
+          <p:nvPr>
+            <p:ph idx="1"/>
+          </p:nvPr>
+        </p:nvSpPr>
+        <p:spPr/>
+        <p:txBody>
+          <a:bodyPr/>
+          <a:lstStyle/>
+          <a:p>
+            <a:endParaRPr lang="de-AT"/>
+          </a:p>
+        </p:txBody>
+      </p:sp>
+    </p:spTree>
+    <p:extLst>
+      <p:ext uri="{BB962C8B-B14F-4D97-AF65-F5344CB8AC3E}">
+        <p14:creationId xmlns:p14="http://schemas.microsoft.com/office/powerpoint/2010/main" val="4244075057"/>
+      </p:ext>
+    </p:extLst>
+  </p:cSld>
+  <p:clrMapOvr>
+    <a:masterClrMapping/>
+  </p:clrMapOvr>
+</p:sld>
+</file>
+
+<file path=ppt/slides/slide6.xml><?xml version="1.0" encoding="utf-8"?>
+<p:sld xmlns:a="http://schemas.openxmlformats.org/drawingml/2006/main" xmlns:r="http://schemas.openxmlformats.org/officeDocument/2006/relationships" xmlns:p="http://schemas.openxmlformats.org/presentationml/2006/main">
+  <p:cSld>
+    <p:spTree>
+      <p:nvGrpSpPr>
+        <p:cNvPr id="1" name=""/>
+        <p:cNvGrpSpPr/>
+        <p:nvPr/>
+      </p:nvGrpSpPr>
+      <p:grpSpPr>
+        <a:xfrm>
+          <a:off x="0" y="0"/>
+          <a:ext cx="0" cy="0"/>
+          <a:chOff x="0" y="0"/>
+          <a:chExt cx="0" cy="0"/>
+        </a:xfrm>
+      </p:grpSpPr>
+      <p:sp>
+        <p:nvSpPr>
+          <p:cNvPr id="2" name="Title 1">
+            <a:extLst>
+              <a:ext uri="{FF2B5EF4-FFF2-40B4-BE49-F238E27FC236}">
+                <a16:creationId xmlns:a16="http://schemas.microsoft.com/office/drawing/2014/main" id="{DC99B76B-690A-D473-6489-8EBA89769C27}"/>
+              </a:ext>
+            </a:extLst>
+          </p:cNvPr>
+          <p:cNvSpPr>
+            <a:spLocks noGrp="1"/>
+          </p:cNvSpPr>
+          <p:nvPr>
+            <p:ph type="title"/>
+          </p:nvPr>
+        </p:nvSpPr>
+        <p:spPr/>
+        <p:txBody>
+          <a:bodyPr/>
+          <a:lstStyle/>
+          <a:p>
+            <a:r>
+              <a:rPr lang="de-DE" dirty="0"/>
+              <a:t>Hyperparameter </a:t>
+            </a:r>
+            <a:r>
+              <a:rPr lang="de-DE" dirty="0" err="1"/>
+              <a:t>optimization</a:t>
+            </a:r>
+            <a:endParaRPr lang="de-AT" dirty="0"/>
+          </a:p>
+        </p:txBody>
+      </p:sp>
+      <p:sp>
+        <p:nvSpPr>
+          <p:cNvPr id="3" name="Content Placeholder 2">
+            <a:extLst>
+              <a:ext uri="{FF2B5EF4-FFF2-40B4-BE49-F238E27FC236}">
+                <a16:creationId xmlns:a16="http://schemas.microsoft.com/office/drawing/2014/main" id="{0A9D697E-4ADF-2F55-0E09-4F1AB55C3465}"/>
+              </a:ext>
+            </a:extLst>
+          </p:cNvPr>
+          <p:cNvSpPr>
+            <a:spLocks noGrp="1"/>
+          </p:cNvSpPr>
+          <p:nvPr>
+            <p:ph idx="1"/>
+          </p:nvPr>
+        </p:nvSpPr>
+        <p:spPr/>
+        <p:txBody>
+          <a:bodyPr/>
+          <a:lstStyle/>
+          <a:p>
+            <a:endParaRPr lang="de-AT"/>
+          </a:p>
+        </p:txBody>
+      </p:sp>
+    </p:spTree>
+    <p:extLst>
+      <p:ext uri="{BB962C8B-B14F-4D97-AF65-F5344CB8AC3E}">
+        <p14:creationId xmlns:p14="http://schemas.microsoft.com/office/powerpoint/2010/main" val="2778680789"/>
+      </p:ext>
+    </p:extLst>
+  </p:cSld>
+  <p:clrMapOvr>
+    <a:masterClrMapping/>
+  </p:clrMapOvr>
+</p:sld>
+</file>
+
+<file path=ppt/slides/slide7.xml><?xml version="1.0" encoding="utf-8"?>
+<p:sld xmlns:a="http://schemas.openxmlformats.org/drawingml/2006/main" xmlns:r="http://schemas.openxmlformats.org/officeDocument/2006/relationships" xmlns:p="http://schemas.openxmlformats.org/presentationml/2006/main">
+  <p:cSld>
+    <p:spTree>
+      <p:nvGrpSpPr>
+        <p:cNvPr id="1" name=""/>
+        <p:cNvGrpSpPr/>
+        <p:nvPr/>
+      </p:nvGrpSpPr>
+      <p:grpSpPr>
+        <a:xfrm>
+          <a:off x="0" y="0"/>
+          <a:ext cx="0" cy="0"/>
+          <a:chOff x="0" y="0"/>
+          <a:chExt cx="0" cy="0"/>
+        </a:xfrm>
+      </p:grpSpPr>
+      <p:sp>
+        <p:nvSpPr>
+          <p:cNvPr id="2" name="Title 1">
+            <a:extLst>
+              <a:ext uri="{FF2B5EF4-FFF2-40B4-BE49-F238E27FC236}">
+                <a16:creationId xmlns:a16="http://schemas.microsoft.com/office/drawing/2014/main" id="{44507AA4-E8F1-18B6-384D-A7EAF861E7A6}"/>
+              </a:ext>
+            </a:extLst>
+          </p:cNvPr>
+          <p:cNvSpPr>
+            <a:spLocks noGrp="1"/>
+          </p:cNvSpPr>
+          <p:nvPr>
+            <p:ph type="title"/>
+          </p:nvPr>
+        </p:nvSpPr>
+        <p:spPr/>
+        <p:txBody>
+          <a:bodyPr/>
+          <a:lstStyle/>
+          <a:p>
+            <a:r>
+              <a:rPr lang="de-DE" dirty="0" err="1"/>
+              <a:t>Comparison</a:t>
+            </a:r>
+            <a:r>
+              <a:rPr lang="de-DE" dirty="0"/>
+              <a:t> </a:t>
+            </a:r>
+            <a:r>
+              <a:rPr lang="de-DE" dirty="0" err="1"/>
+              <a:t>to</a:t>
+            </a:r>
+            <a:r>
+              <a:rPr lang="de-DE" dirty="0"/>
+              <a:t> </a:t>
+            </a:r>
+            <a:r>
+              <a:rPr lang="de-DE" dirty="0" err="1"/>
+              <a:t>scikit</a:t>
+            </a:r>
+            <a:r>
+              <a:rPr lang="de-DE" dirty="0"/>
+              <a:t> </a:t>
+            </a:r>
+            <a:r>
+              <a:rPr lang="de-DE" dirty="0" err="1"/>
+              <a:t>learn</a:t>
+            </a:r>
+            <a:r>
+              <a:rPr lang="de-DE" dirty="0"/>
+              <a:t> </a:t>
+            </a:r>
+            <a:r>
+              <a:rPr lang="de-DE" dirty="0" err="1"/>
+              <a:t>DecisionTreeRegressor</a:t>
+            </a:r>
+            <a:r>
+              <a:rPr lang="de-DE" dirty="0"/>
+              <a:t> </a:t>
+            </a:r>
+            <a:endParaRPr lang="de-AT" dirty="0"/>
+          </a:p>
+        </p:txBody>
+      </p:sp>
+      <p:sp>
+        <p:nvSpPr>
+          <p:cNvPr id="3" name="Content Placeholder 2">
+            <a:extLst>
+              <a:ext uri="{FF2B5EF4-FFF2-40B4-BE49-F238E27FC236}">
+                <a16:creationId xmlns:a16="http://schemas.microsoft.com/office/drawing/2014/main" id="{20C3F7A4-DC70-2815-C3BC-43BFCD5E11B8}"/>
+              </a:ext>
+            </a:extLst>
+          </p:cNvPr>
+          <p:cNvSpPr>
+            <a:spLocks noGrp="1"/>
+          </p:cNvSpPr>
+          <p:nvPr>
+            <p:ph idx="1"/>
+          </p:nvPr>
+        </p:nvSpPr>
+        <p:spPr/>
+        <p:txBody>
+          <a:bodyPr/>
+          <a:lstStyle/>
+          <a:p>
+            <a:endParaRPr lang="de-AT"/>
+          </a:p>
+        </p:txBody>
+      </p:sp>
+    </p:spTree>
+    <p:extLst>
+      <p:ext uri="{BB962C8B-B14F-4D97-AF65-F5344CB8AC3E}">
+        <p14:creationId xmlns:p14="http://schemas.microsoft.com/office/powerpoint/2010/main" val="1949933045"/>
+      </p:ext>
+    </p:extLst>
+  </p:cSld>
+  <p:clrMapOvr>
+    <a:masterClrMapping/>
+  </p:clrMapOvr>
+</p:sld>
+</file>
+
+<file path=ppt/slides/slide8.xml><?xml version="1.0" encoding="utf-8"?>
+<p:sld xmlns:a="http://schemas.openxmlformats.org/drawingml/2006/main" xmlns:r="http://schemas.openxmlformats.org/officeDocument/2006/relationships" xmlns:p="http://schemas.openxmlformats.org/presentationml/2006/main">
+  <p:cSld>
+    <p:spTree>
+      <p:nvGrpSpPr>
+        <p:cNvPr id="1" name=""/>
+        <p:cNvGrpSpPr/>
+        <p:nvPr/>
+      </p:nvGrpSpPr>
+      <p:grpSpPr>
+        <a:xfrm>
+          <a:off x="0" y="0"/>
+          <a:ext cx="0" cy="0"/>
+          <a:chOff x="0" y="0"/>
+          <a:chExt cx="0" cy="0"/>
+        </a:xfrm>
+      </p:grpSpPr>
+      <p:sp>
+        <p:nvSpPr>
+          <p:cNvPr id="2" name="Title 1">
+            <a:extLst>
+              <a:ext uri="{FF2B5EF4-FFF2-40B4-BE49-F238E27FC236}">
+                <a16:creationId xmlns:a16="http://schemas.microsoft.com/office/drawing/2014/main" id="{ACF1EA68-71E2-CFFF-77D9-9092BD40F57C}"/>
+              </a:ext>
+            </a:extLst>
+          </p:cNvPr>
+          <p:cNvSpPr>
+            <a:spLocks noGrp="1"/>
+          </p:cNvSpPr>
+          <p:nvPr>
+            <p:ph type="title"/>
+          </p:nvPr>
+        </p:nvSpPr>
+        <p:spPr/>
+        <p:txBody>
+          <a:bodyPr/>
+          <a:lstStyle/>
+          <a:p>
+            <a:r>
+              <a:rPr lang="en-US" dirty="0"/>
+              <a:t>Comparison</a:t>
+            </a:r>
+            <a:r>
+              <a:rPr lang="de-DE" dirty="0"/>
+              <a:t> </a:t>
+            </a:r>
+            <a:r>
+              <a:rPr lang="de-DE" dirty="0" err="1"/>
+              <a:t>to</a:t>
+            </a:r>
+            <a:r>
+              <a:rPr lang="de-DE" dirty="0"/>
+              <a:t> </a:t>
+            </a:r>
+            <a:r>
+              <a:rPr lang="de-DE" dirty="0" err="1"/>
+              <a:t>scikit</a:t>
+            </a:r>
+            <a:r>
+              <a:rPr lang="de-DE" dirty="0"/>
+              <a:t> </a:t>
+            </a:r>
+            <a:r>
+              <a:rPr lang="de-DE" dirty="0" err="1"/>
+              <a:t>learn</a:t>
+            </a:r>
+            <a:r>
+              <a:rPr lang="de-DE" dirty="0"/>
+              <a:t> </a:t>
+            </a:r>
+            <a:r>
+              <a:rPr lang="de-DE" dirty="0" err="1"/>
+              <a:t>RandomForestRegressor</a:t>
+            </a:r>
+            <a:endParaRPr lang="de-AT" dirty="0"/>
+          </a:p>
+        </p:txBody>
+      </p:sp>
+      <p:sp>
+        <p:nvSpPr>
+          <p:cNvPr id="3" name="Content Placeholder 2">
+            <a:extLst>
+              <a:ext uri="{FF2B5EF4-FFF2-40B4-BE49-F238E27FC236}">
+                <a16:creationId xmlns:a16="http://schemas.microsoft.com/office/drawing/2014/main" id="{862D0347-F04C-D218-02C2-4F0512D86408}"/>
+              </a:ext>
+            </a:extLst>
+          </p:cNvPr>
+          <p:cNvSpPr>
+            <a:spLocks noGrp="1"/>
+          </p:cNvSpPr>
+          <p:nvPr>
+            <p:ph idx="1"/>
+          </p:nvPr>
+        </p:nvSpPr>
+        <p:spPr/>
+        <p:txBody>
+          <a:bodyPr/>
+          <a:lstStyle/>
+          <a:p>
+            <a:endParaRPr lang="de-AT"/>
+          </a:p>
+        </p:txBody>
+      </p:sp>
+    </p:spTree>
+    <p:extLst>
+      <p:ext uri="{BB962C8B-B14F-4D97-AF65-F5344CB8AC3E}">
+        <p14:creationId xmlns:p14="http://schemas.microsoft.com/office/powerpoint/2010/main" val="2625827110"/>
+      </p:ext>
+    </p:extLst>
+  </p:cSld>
+  <p:clrMapOvr>
+    <a:masterClrMapping/>
+  </p:clrMapOvr>
+</p:sld>
+</file>
+
+<file path=ppt/slides/slide9.xml><?xml version="1.0" encoding="utf-8"?>
+<p:sld xmlns:a="http://schemas.openxmlformats.org/drawingml/2006/main" xmlns:r="http://schemas.openxmlformats.org/officeDocument/2006/relationships" xmlns:p="http://schemas.openxmlformats.org/presentationml/2006/main">
+  <p:cSld>
+    <p:spTree>
+      <p:nvGrpSpPr>
+        <p:cNvPr id="1" name=""/>
+        <p:cNvGrpSpPr/>
+        <p:nvPr/>
+      </p:nvGrpSpPr>
+      <p:grpSpPr>
+        <a:xfrm>
+          <a:off x="0" y="0"/>
+          <a:ext cx="0" cy="0"/>
+          <a:chOff x="0" y="0"/>
+          <a:chExt cx="0" cy="0"/>
+        </a:xfrm>
+      </p:grpSpPr>
+      <p:sp>
+        <p:nvSpPr>
+          <p:cNvPr id="2" name="Title 1">
+            <a:extLst>
+              <a:ext uri="{FF2B5EF4-FFF2-40B4-BE49-F238E27FC236}">
+                <a16:creationId xmlns:a16="http://schemas.microsoft.com/office/drawing/2014/main" id="{2D8F8289-407F-B67A-7169-6CF13174AF57}"/>
+              </a:ext>
+            </a:extLst>
+          </p:cNvPr>
+          <p:cNvSpPr>
+            <a:spLocks noGrp="1"/>
+          </p:cNvSpPr>
+          <p:nvPr>
+            <p:ph type="title"/>
+          </p:nvPr>
+        </p:nvSpPr>
+        <p:spPr/>
+        <p:txBody>
+          <a:bodyPr/>
+          <a:lstStyle/>
+          <a:p>
+            <a:r>
+              <a:rPr lang="de-DE" dirty="0" err="1"/>
+              <a:t>Comparison</a:t>
+            </a:r>
+            <a:r>
+              <a:rPr lang="de-DE" dirty="0"/>
+              <a:t> </a:t>
+            </a:r>
+            <a:r>
+              <a:rPr lang="de-DE" dirty="0" err="1"/>
+              <a:t>to</a:t>
+            </a:r>
+            <a:r>
+              <a:rPr lang="de-DE" dirty="0"/>
+              <a:t> LLM </a:t>
+            </a:r>
+            <a:r>
+              <a:rPr lang="de-DE" dirty="0" err="1"/>
+              <a:t>version</a:t>
+            </a:r>
+            <a:endParaRPr lang="de-AT" dirty="0"/>
+          </a:p>
+        </p:txBody>
+      </p:sp>
+      <p:sp>
+        <p:nvSpPr>
+          <p:cNvPr id="3" name="Content Placeholder 2">
+            <a:extLst>
+              <a:ext uri="{FF2B5EF4-FFF2-40B4-BE49-F238E27FC236}">
+                <a16:creationId xmlns:a16="http://schemas.microsoft.com/office/drawing/2014/main" id="{0358DEBD-0580-CCFC-97FB-D946EFFD3344}"/>
+              </a:ext>
+            </a:extLst>
+          </p:cNvPr>
+          <p:cNvSpPr>
+            <a:spLocks noGrp="1"/>
+          </p:cNvSpPr>
+          <p:nvPr>
+            <p:ph idx="1"/>
+          </p:nvPr>
+        </p:nvSpPr>
+        <p:spPr/>
+        <p:txBody>
+          <a:bodyPr/>
+          <a:lstStyle/>
+          <a:p>
+            <a:endParaRPr lang="de-AT"/>
+          </a:p>
+        </p:txBody>
+      </p:sp>
+    </p:spTree>
+    <p:extLst>
+      <p:ext uri="{BB962C8B-B14F-4D97-AF65-F5344CB8AC3E}">
+        <p14:creationId xmlns:p14="http://schemas.microsoft.com/office/powerpoint/2010/main" val="271810423"/>
       </p:ext>
     </p:extLst>
   </p:cSld>

</xml_diff>

<commit_message>
some updates to presentation
</commit_message>
<xml_diff>
--- a/ex2/Exercise_2_ppt.pptx
+++ b/ex2/Exercise_2_ppt.pptx
@@ -126,17 +126,25 @@
 </p:presentation>
 </file>
 
+<file path=ppt/revisionInfo.xml><?xml version="1.0" encoding="utf-8"?>
+<p1510:revInfo xmlns:a="http://schemas.openxmlformats.org/drawingml/2006/main" xmlns:r="http://schemas.openxmlformats.org/officeDocument/2006/relationships" xmlns:p1510="http://schemas.microsoft.com/office/powerpoint/2015/10/main">
+  <p1510:revLst>
+    <p1510:client id="{C41F04A2-1B58-4C51-987F-CBD3CF99D29E}" v="3" dt="2024-12-15T18:34:46.001"/>
+  </p1510:revLst>
+</p1510:revInfo>
+</file>
+
 <file path=ppt/changesInfos/changesInfo1.xml><?xml version="1.0" encoding="utf-8"?>
 <pc:chgInfo xmlns:a="http://schemas.openxmlformats.org/drawingml/2006/main" xmlns:r="http://schemas.openxmlformats.org/officeDocument/2006/relationships" xmlns:ac="http://schemas.microsoft.com/office/drawing/2013/main/command" xmlns:pc="http://schemas.microsoft.com/office/powerpoint/2013/main/command">
   <pc:docChgLst>
     <pc:chgData name="Haubenburger, Gabriel" userId="d79be2aa-0303-4748-b5e6-c8202455e92e" providerId="ADAL" clId="{C41F04A2-1B58-4C51-987F-CBD3CF99D29E}"/>
-    <pc:docChg chg="addSld modSld sldOrd">
-      <pc:chgData name="Haubenburger, Gabriel" userId="d79be2aa-0303-4748-b5e6-c8202455e92e" providerId="ADAL" clId="{C41F04A2-1B58-4C51-987F-CBD3CF99D29E}" dt="2024-12-15T14:42:22.649" v="296" actId="20577"/>
+    <pc:docChg chg="undo custSel addSld modSld sldOrd">
+      <pc:chgData name="Haubenburger, Gabriel" userId="d79be2aa-0303-4748-b5e6-c8202455e92e" providerId="ADAL" clId="{C41F04A2-1B58-4C51-987F-CBD3CF99D29E}" dt="2024-12-15T18:37:24.439" v="753" actId="20577"/>
       <pc:docMkLst>
         <pc:docMk/>
       </pc:docMkLst>
       <pc:sldChg chg="modSp mod">
-        <pc:chgData name="Haubenburger, Gabriel" userId="d79be2aa-0303-4748-b5e6-c8202455e92e" providerId="ADAL" clId="{C41F04A2-1B58-4C51-987F-CBD3CF99D29E}" dt="2024-12-15T14:36:35.033" v="20" actId="20577"/>
+        <pc:chgData name="Haubenburger, Gabriel" userId="d79be2aa-0303-4748-b5e6-c8202455e92e" providerId="ADAL" clId="{C41F04A2-1B58-4C51-987F-CBD3CF99D29E}" dt="2024-12-15T18:30:27.216" v="420" actId="20577"/>
         <pc:sldMkLst>
           <pc:docMk/>
           <pc:sldMk cId="3647451211" sldId="257"/>
@@ -149,24 +157,40 @@
             <ac:spMk id="2" creationId="{76FF67D3-B55B-1A2C-CABD-B97CE0F8F85D}"/>
           </ac:spMkLst>
         </pc:spChg>
+        <pc:spChg chg="mod">
+          <ac:chgData name="Haubenburger, Gabriel" userId="d79be2aa-0303-4748-b5e6-c8202455e92e" providerId="ADAL" clId="{C41F04A2-1B58-4C51-987F-CBD3CF99D29E}" dt="2024-12-15T18:30:27.216" v="420" actId="20577"/>
+          <ac:spMkLst>
+            <pc:docMk/>
+            <pc:sldMk cId="3647451211" sldId="257"/>
+            <ac:spMk id="3" creationId="{81CB7FBD-1F71-A08C-1886-60F43C36D18B}"/>
+          </ac:spMkLst>
+        </pc:spChg>
       </pc:sldChg>
       <pc:sldChg chg="modSp new mod">
-        <pc:chgData name="Haubenburger, Gabriel" userId="d79be2aa-0303-4748-b5e6-c8202455e92e" providerId="ADAL" clId="{C41F04A2-1B58-4C51-987F-CBD3CF99D29E}" dt="2024-12-15T14:37:10.018" v="45" actId="20577"/>
+        <pc:chgData name="Haubenburger, Gabriel" userId="d79be2aa-0303-4748-b5e6-c8202455e92e" providerId="ADAL" clId="{C41F04A2-1B58-4C51-987F-CBD3CF99D29E}" dt="2024-12-15T18:35:41.124" v="541" actId="790"/>
         <pc:sldMkLst>
           <pc:docMk/>
           <pc:sldMk cId="225849889" sldId="258"/>
         </pc:sldMkLst>
         <pc:spChg chg="mod">
-          <ac:chgData name="Haubenburger, Gabriel" userId="d79be2aa-0303-4748-b5e6-c8202455e92e" providerId="ADAL" clId="{C41F04A2-1B58-4C51-987F-CBD3CF99D29E}" dt="2024-12-15T14:37:10.018" v="45" actId="20577"/>
+          <ac:chgData name="Haubenburger, Gabriel" userId="d79be2aa-0303-4748-b5e6-c8202455e92e" providerId="ADAL" clId="{C41F04A2-1B58-4C51-987F-CBD3CF99D29E}" dt="2024-12-15T18:32:57.209" v="462" actId="790"/>
           <ac:spMkLst>
             <pc:docMk/>
             <pc:sldMk cId="225849889" sldId="258"/>
             <ac:spMk id="2" creationId="{D53941FA-7273-3406-419C-D52C9C290FFD}"/>
           </ac:spMkLst>
         </pc:spChg>
+        <pc:spChg chg="mod">
+          <ac:chgData name="Haubenburger, Gabriel" userId="d79be2aa-0303-4748-b5e6-c8202455e92e" providerId="ADAL" clId="{C41F04A2-1B58-4C51-987F-CBD3CF99D29E}" dt="2024-12-15T18:35:41.124" v="541" actId="790"/>
+          <ac:spMkLst>
+            <pc:docMk/>
+            <pc:sldMk cId="225849889" sldId="258"/>
+            <ac:spMk id="3" creationId="{BB3969EE-A50A-F4A8-56A6-D2F56033ADBA}"/>
+          </ac:spMkLst>
+        </pc:spChg>
       </pc:sldChg>
       <pc:sldChg chg="modSp new mod">
-        <pc:chgData name="Haubenburger, Gabriel" userId="d79be2aa-0303-4748-b5e6-c8202455e92e" providerId="ADAL" clId="{C41F04A2-1B58-4C51-987F-CBD3CF99D29E}" dt="2024-12-15T14:37:17.361" v="68" actId="20577"/>
+        <pc:chgData name="Haubenburger, Gabriel" userId="d79be2aa-0303-4748-b5e6-c8202455e92e" providerId="ADAL" clId="{C41F04A2-1B58-4C51-987F-CBD3CF99D29E}" dt="2024-12-15T18:37:24.439" v="753" actId="20577"/>
         <pc:sldMkLst>
           <pc:docMk/>
           <pc:sldMk cId="4244075057" sldId="259"/>
@@ -179,30 +203,46 @@
             <ac:spMk id="2" creationId="{D00F6813-54FC-527F-C6A4-D8A65970CE8E}"/>
           </ac:spMkLst>
         </pc:spChg>
+        <pc:spChg chg="mod">
+          <ac:chgData name="Haubenburger, Gabriel" userId="d79be2aa-0303-4748-b5e6-c8202455e92e" providerId="ADAL" clId="{C41F04A2-1B58-4C51-987F-CBD3CF99D29E}" dt="2024-12-15T18:37:24.439" v="753" actId="20577"/>
+          <ac:spMkLst>
+            <pc:docMk/>
+            <pc:sldMk cId="4244075057" sldId="259"/>
+            <ac:spMk id="3" creationId="{BC38231A-ECB4-0153-0411-F74632AD3135}"/>
+          </ac:spMkLst>
+        </pc:spChg>
       </pc:sldChg>
       <pc:sldChg chg="modSp new mod ord">
-        <pc:chgData name="Haubenburger, Gabriel" userId="d79be2aa-0303-4748-b5e6-c8202455e92e" providerId="ADAL" clId="{C41F04A2-1B58-4C51-987F-CBD3CF99D29E}" dt="2024-12-15T14:37:35.113" v="83" actId="20577"/>
+        <pc:chgData name="Haubenburger, Gabriel" userId="d79be2aa-0303-4748-b5e6-c8202455e92e" providerId="ADAL" clId="{C41F04A2-1B58-4C51-987F-CBD3CF99D29E}" dt="2024-12-15T18:34:39.875" v="470" actId="790"/>
         <pc:sldMkLst>
           <pc:docMk/>
           <pc:sldMk cId="156605029" sldId="260"/>
         </pc:sldMkLst>
         <pc:spChg chg="mod">
-          <ac:chgData name="Haubenburger, Gabriel" userId="d79be2aa-0303-4748-b5e6-c8202455e92e" providerId="ADAL" clId="{C41F04A2-1B58-4C51-987F-CBD3CF99D29E}" dt="2024-12-15T14:37:35.113" v="83" actId="20577"/>
+          <ac:chgData name="Haubenburger, Gabriel" userId="d79be2aa-0303-4748-b5e6-c8202455e92e" providerId="ADAL" clId="{C41F04A2-1B58-4C51-987F-CBD3CF99D29E}" dt="2024-12-15T18:34:39.875" v="470" actId="790"/>
           <ac:spMkLst>
             <pc:docMk/>
             <pc:sldMk cId="156605029" sldId="260"/>
             <ac:spMk id="2" creationId="{43E5E657-5791-8DDB-8C86-08F40B5DA77F}"/>
           </ac:spMkLst>
         </pc:spChg>
+        <pc:spChg chg="mod">
+          <ac:chgData name="Haubenburger, Gabriel" userId="d79be2aa-0303-4748-b5e6-c8202455e92e" providerId="ADAL" clId="{C41F04A2-1B58-4C51-987F-CBD3CF99D29E}" dt="2024-12-15T18:34:39.875" v="470" actId="790"/>
+          <ac:spMkLst>
+            <pc:docMk/>
+            <pc:sldMk cId="156605029" sldId="260"/>
+            <ac:spMk id="3" creationId="{FFBFFA5E-236F-3279-8F0F-D69DEC44B6B0}"/>
+          </ac:spMkLst>
+        </pc:spChg>
       </pc:sldChg>
       <pc:sldChg chg="modSp new mod">
-        <pc:chgData name="Haubenburger, Gabriel" userId="d79be2aa-0303-4748-b5e6-c8202455e92e" providerId="ADAL" clId="{C41F04A2-1B58-4C51-987F-CBD3CF99D29E}" dt="2024-12-15T14:38:36.441" v="116" actId="20577"/>
+        <pc:chgData name="Haubenburger, Gabriel" userId="d79be2aa-0303-4748-b5e6-c8202455e92e" providerId="ADAL" clId="{C41F04A2-1B58-4C51-987F-CBD3CF99D29E}" dt="2024-12-15T18:33:12.835" v="463" actId="790"/>
         <pc:sldMkLst>
           <pc:docMk/>
           <pc:sldMk cId="2778680789" sldId="261"/>
         </pc:sldMkLst>
         <pc:spChg chg="mod">
-          <ac:chgData name="Haubenburger, Gabriel" userId="d79be2aa-0303-4748-b5e6-c8202455e92e" providerId="ADAL" clId="{C41F04A2-1B58-4C51-987F-CBD3CF99D29E}" dt="2024-12-15T14:38:36.441" v="116" actId="20577"/>
+          <ac:chgData name="Haubenburger, Gabriel" userId="d79be2aa-0303-4748-b5e6-c8202455e92e" providerId="ADAL" clId="{C41F04A2-1B58-4C51-987F-CBD3CF99D29E}" dt="2024-12-15T18:33:12.835" v="463" actId="790"/>
           <ac:spMkLst>
             <pc:docMk/>
             <pc:sldMk cId="2778680789" sldId="261"/>
@@ -211,13 +251,13 @@
         </pc:spChg>
       </pc:sldChg>
       <pc:sldChg chg="modSp new mod">
-        <pc:chgData name="Haubenburger, Gabriel" userId="d79be2aa-0303-4748-b5e6-c8202455e92e" providerId="ADAL" clId="{C41F04A2-1B58-4C51-987F-CBD3CF99D29E}" dt="2024-12-15T14:41:34.945" v="286" actId="20577"/>
+        <pc:chgData name="Haubenburger, Gabriel" userId="d79be2aa-0303-4748-b5e6-c8202455e92e" providerId="ADAL" clId="{C41F04A2-1B58-4C51-987F-CBD3CF99D29E}" dt="2024-12-15T18:34:26.137" v="469" actId="790"/>
         <pc:sldMkLst>
           <pc:docMk/>
           <pc:sldMk cId="2625827110" sldId="262"/>
         </pc:sldMkLst>
         <pc:spChg chg="mod">
-          <ac:chgData name="Haubenburger, Gabriel" userId="d79be2aa-0303-4748-b5e6-c8202455e92e" providerId="ADAL" clId="{C41F04A2-1B58-4C51-987F-CBD3CF99D29E}" dt="2024-12-15T14:41:34.945" v="286" actId="20577"/>
+          <ac:chgData name="Haubenburger, Gabriel" userId="d79be2aa-0303-4748-b5e6-c8202455e92e" providerId="ADAL" clId="{C41F04A2-1B58-4C51-987F-CBD3CF99D29E}" dt="2024-12-15T18:34:26.137" v="469" actId="790"/>
           <ac:spMkLst>
             <pc:docMk/>
             <pc:sldMk cId="2625827110" sldId="262"/>
@@ -226,13 +266,13 @@
         </pc:spChg>
       </pc:sldChg>
       <pc:sldChg chg="modSp new mod">
-        <pc:chgData name="Haubenburger, Gabriel" userId="d79be2aa-0303-4748-b5e6-c8202455e92e" providerId="ADAL" clId="{C41F04A2-1B58-4C51-987F-CBD3CF99D29E}" dt="2024-12-15T14:39:29.385" v="193" actId="20577"/>
+        <pc:chgData name="Haubenburger, Gabriel" userId="d79be2aa-0303-4748-b5e6-c8202455e92e" providerId="ADAL" clId="{C41F04A2-1B58-4C51-987F-CBD3CF99D29E}" dt="2024-12-15T18:33:53.071" v="465" actId="790"/>
         <pc:sldMkLst>
           <pc:docMk/>
           <pc:sldMk cId="271810423" sldId="263"/>
         </pc:sldMkLst>
         <pc:spChg chg="mod">
-          <ac:chgData name="Haubenburger, Gabriel" userId="d79be2aa-0303-4748-b5e6-c8202455e92e" providerId="ADAL" clId="{C41F04A2-1B58-4C51-987F-CBD3CF99D29E}" dt="2024-12-15T14:39:29.385" v="193" actId="20577"/>
+          <ac:chgData name="Haubenburger, Gabriel" userId="d79be2aa-0303-4748-b5e6-c8202455e92e" providerId="ADAL" clId="{C41F04A2-1B58-4C51-987F-CBD3CF99D29E}" dt="2024-12-15T18:33:53.071" v="465" actId="790"/>
           <ac:spMkLst>
             <pc:docMk/>
             <pc:sldMk cId="271810423" sldId="263"/>
@@ -241,13 +281,13 @@
         </pc:spChg>
       </pc:sldChg>
       <pc:sldChg chg="modSp new mod ord">
-        <pc:chgData name="Haubenburger, Gabriel" userId="d79be2aa-0303-4748-b5e6-c8202455e92e" providerId="ADAL" clId="{C41F04A2-1B58-4C51-987F-CBD3CF99D29E}" dt="2024-12-15T14:41:25.913" v="264" actId="20577"/>
+        <pc:chgData name="Haubenburger, Gabriel" userId="d79be2aa-0303-4748-b5e6-c8202455e92e" providerId="ADAL" clId="{C41F04A2-1B58-4C51-987F-CBD3CF99D29E}" dt="2024-12-15T18:33:20.022" v="464" actId="790"/>
         <pc:sldMkLst>
           <pc:docMk/>
           <pc:sldMk cId="1949933045" sldId="264"/>
         </pc:sldMkLst>
         <pc:spChg chg="mod">
-          <ac:chgData name="Haubenburger, Gabriel" userId="d79be2aa-0303-4748-b5e6-c8202455e92e" providerId="ADAL" clId="{C41F04A2-1B58-4C51-987F-CBD3CF99D29E}" dt="2024-12-15T14:41:25.913" v="264" actId="20577"/>
+          <ac:chgData name="Haubenburger, Gabriel" userId="d79be2aa-0303-4748-b5e6-c8202455e92e" providerId="ADAL" clId="{C41F04A2-1B58-4C51-987F-CBD3CF99D29E}" dt="2024-12-15T18:33:20.022" v="464" actId="790"/>
           <ac:spMkLst>
             <pc:docMk/>
             <pc:sldMk cId="1949933045" sldId="264"/>
@@ -256,13 +296,13 @@
         </pc:spChg>
       </pc:sldChg>
       <pc:sldChg chg="modSp new mod">
-        <pc:chgData name="Haubenburger, Gabriel" userId="d79be2aa-0303-4748-b5e6-c8202455e92e" providerId="ADAL" clId="{C41F04A2-1B58-4C51-987F-CBD3CF99D29E}" dt="2024-12-15T14:42:22.649" v="296" actId="20577"/>
+        <pc:chgData name="Haubenburger, Gabriel" userId="d79be2aa-0303-4748-b5e6-c8202455e92e" providerId="ADAL" clId="{C41F04A2-1B58-4C51-987F-CBD3CF99D29E}" dt="2024-12-15T18:34:00.480" v="466" actId="790"/>
         <pc:sldMkLst>
           <pc:docMk/>
           <pc:sldMk cId="3637246051" sldId="265"/>
         </pc:sldMkLst>
         <pc:spChg chg="mod">
-          <ac:chgData name="Haubenburger, Gabriel" userId="d79be2aa-0303-4748-b5e6-c8202455e92e" providerId="ADAL" clId="{C41F04A2-1B58-4C51-987F-CBD3CF99D29E}" dt="2024-12-15T14:42:22.649" v="296" actId="20577"/>
+          <ac:chgData name="Haubenburger, Gabriel" userId="d79be2aa-0303-4748-b5e6-c8202455e92e" providerId="ADAL" clId="{C41F04A2-1B58-4C51-987F-CBD3CF99D29E}" dt="2024-12-15T18:34:00.480" v="466" actId="790"/>
           <ac:spMkLst>
             <pc:docMk/>
             <pc:sldMk cId="3637246051" sldId="265"/>
@@ -498,7 +538,7 @@
               <a:rPr lang="en-IN" smtClean="0"/>
               <a:t>15-12-2024</a:t>
             </a:fld>
-            <a:endParaRPr lang="en-IN"/>
+            <a:endParaRPr lang="en-IN" dirty="0"/>
           </a:p>
         </p:txBody>
       </p:sp>
@@ -517,7 +557,7 @@
           <a:bodyPr/>
           <a:lstStyle/>
           <a:p>
-            <a:endParaRPr lang="en-IN"/>
+            <a:endParaRPr lang="en-IN" dirty="0"/>
           </a:p>
         </p:txBody>
       </p:sp>
@@ -540,7 +580,7 @@
               <a:rPr lang="en-IN" smtClean="0"/>
               <a:t>‹#›</a:t>
             </a:fld>
-            <a:endParaRPr lang="en-IN"/>
+            <a:endParaRPr lang="en-IN" dirty="0"/>
           </a:p>
         </p:txBody>
       </p:sp>
@@ -680,10 +720,9 @@
           </a:lstStyle>
           <a:p>
             <a:r>
-              <a:rPr lang="en-US"/>
+              <a:rPr lang="en-US" dirty="0"/>
               <a:t>Click icon to add picture</a:t>
             </a:r>
-            <a:endParaRPr lang="en-US" dirty="0"/>
           </a:p>
         </p:txBody>
       </p:sp>
@@ -773,7 +812,7 @@
               <a:rPr lang="en-IN" smtClean="0"/>
               <a:t>15-12-2024</a:t>
             </a:fld>
-            <a:endParaRPr lang="en-IN"/>
+            <a:endParaRPr lang="en-IN" dirty="0"/>
           </a:p>
         </p:txBody>
       </p:sp>
@@ -792,7 +831,7 @@
           <a:bodyPr/>
           <a:lstStyle/>
           <a:p>
-            <a:endParaRPr lang="en-IN"/>
+            <a:endParaRPr lang="en-IN" dirty="0"/>
           </a:p>
         </p:txBody>
       </p:sp>
@@ -815,7 +854,7 @@
               <a:rPr lang="en-IN" smtClean="0"/>
               <a:t>‹#›</a:t>
             </a:fld>
-            <a:endParaRPr lang="en-IN"/>
+            <a:endParaRPr lang="en-IN" dirty="0"/>
           </a:p>
         </p:txBody>
       </p:sp>
@@ -967,7 +1006,7 @@
               <a:rPr lang="en-IN" smtClean="0"/>
               <a:t>15-12-2024</a:t>
             </a:fld>
-            <a:endParaRPr lang="en-IN"/>
+            <a:endParaRPr lang="en-IN" dirty="0"/>
           </a:p>
         </p:txBody>
       </p:sp>
@@ -986,7 +1025,7 @@
           <a:bodyPr/>
           <a:lstStyle/>
           <a:p>
-            <a:endParaRPr lang="en-IN"/>
+            <a:endParaRPr lang="en-IN" dirty="0"/>
           </a:p>
         </p:txBody>
       </p:sp>
@@ -1009,7 +1048,7 @@
               <a:rPr lang="en-IN" smtClean="0"/>
               <a:t>‹#›</a:t>
             </a:fld>
-            <a:endParaRPr lang="en-IN"/>
+            <a:endParaRPr lang="en-IN" dirty="0"/>
           </a:p>
         </p:txBody>
       </p:sp>
@@ -1240,7 +1279,7 @@
               <a:rPr lang="en-IN" smtClean="0"/>
               <a:t>15-12-2024</a:t>
             </a:fld>
-            <a:endParaRPr lang="en-IN"/>
+            <a:endParaRPr lang="en-IN" dirty="0"/>
           </a:p>
         </p:txBody>
       </p:sp>
@@ -1259,7 +1298,7 @@
           <a:bodyPr/>
           <a:lstStyle/>
           <a:p>
-            <a:endParaRPr lang="en-IN"/>
+            <a:endParaRPr lang="en-IN" dirty="0"/>
           </a:p>
         </p:txBody>
       </p:sp>
@@ -1282,7 +1321,7 @@
               <a:rPr lang="en-IN" smtClean="0"/>
               <a:t>‹#›</a:t>
             </a:fld>
-            <a:endParaRPr lang="en-IN"/>
+            <a:endParaRPr lang="en-IN" dirty="0"/>
           </a:p>
         </p:txBody>
       </p:sp>
@@ -1581,7 +1620,7 @@
               <a:rPr lang="en-IN" smtClean="0"/>
               <a:t>15-12-2024</a:t>
             </a:fld>
-            <a:endParaRPr lang="en-IN"/>
+            <a:endParaRPr lang="en-IN" dirty="0"/>
           </a:p>
         </p:txBody>
       </p:sp>
@@ -1600,7 +1639,7 @@
           <a:bodyPr/>
           <a:lstStyle/>
           <a:p>
-            <a:endParaRPr lang="en-IN"/>
+            <a:endParaRPr lang="en-IN" dirty="0"/>
           </a:p>
         </p:txBody>
       </p:sp>
@@ -1623,7 +1662,7 @@
               <a:rPr lang="en-IN" smtClean="0"/>
               <a:t>‹#›</a:t>
             </a:fld>
-            <a:endParaRPr lang="en-IN"/>
+            <a:endParaRPr lang="en-IN" dirty="0"/>
           </a:p>
         </p:txBody>
       </p:sp>
@@ -2204,7 +2243,7 @@
               <a:rPr lang="en-IN" smtClean="0"/>
               <a:t>15-12-2024</a:t>
             </a:fld>
-            <a:endParaRPr lang="en-IN"/>
+            <a:endParaRPr lang="en-IN" dirty="0"/>
           </a:p>
         </p:txBody>
       </p:sp>
@@ -2223,7 +2262,7 @@
           <a:bodyPr/>
           <a:lstStyle/>
           <a:p>
-            <a:endParaRPr lang="en-IN"/>
+            <a:endParaRPr lang="en-IN" dirty="0"/>
           </a:p>
         </p:txBody>
       </p:sp>
@@ -2246,7 +2285,7 @@
               <a:rPr lang="en-IN" smtClean="0"/>
               <a:t>‹#›</a:t>
             </a:fld>
-            <a:endParaRPr lang="en-IN"/>
+            <a:endParaRPr lang="en-IN" dirty="0"/>
           </a:p>
         </p:txBody>
       </p:sp>
@@ -2453,10 +2492,9 @@
           </a:lstStyle>
           <a:p>
             <a:r>
-              <a:rPr lang="en-US"/>
+              <a:rPr lang="en-US" dirty="0"/>
               <a:t>Click icon to add picture</a:t>
             </a:r>
-            <a:endParaRPr lang="en-US" dirty="0"/>
           </a:p>
         </p:txBody>
       </p:sp>
@@ -2673,10 +2711,9 @@
           </a:lstStyle>
           <a:p>
             <a:r>
-              <a:rPr lang="en-US"/>
+              <a:rPr lang="en-US" dirty="0"/>
               <a:t>Click icon to add picture</a:t>
             </a:r>
-            <a:endParaRPr lang="en-US" dirty="0"/>
           </a:p>
         </p:txBody>
       </p:sp>
@@ -2893,10 +2930,9 @@
           </a:lstStyle>
           <a:p>
             <a:r>
-              <a:rPr lang="en-US"/>
+              <a:rPr lang="en-US" dirty="0"/>
               <a:t>Click icon to add picture</a:t>
             </a:r>
-            <a:endParaRPr lang="en-US" dirty="0"/>
           </a:p>
         </p:txBody>
       </p:sp>
@@ -3064,7 +3100,7 @@
               <a:rPr lang="en-IN" smtClean="0"/>
               <a:t>15-12-2024</a:t>
             </a:fld>
-            <a:endParaRPr lang="en-IN"/>
+            <a:endParaRPr lang="en-IN" dirty="0"/>
           </a:p>
         </p:txBody>
       </p:sp>
@@ -3083,7 +3119,7 @@
           <a:bodyPr/>
           <a:lstStyle/>
           <a:p>
-            <a:endParaRPr lang="en-IN"/>
+            <a:endParaRPr lang="en-IN" dirty="0"/>
           </a:p>
         </p:txBody>
       </p:sp>
@@ -3106,7 +3142,7 @@
               <a:rPr lang="en-IN" smtClean="0"/>
               <a:t>‹#›</a:t>
             </a:fld>
-            <a:endParaRPr lang="en-IN"/>
+            <a:endParaRPr lang="en-IN" dirty="0"/>
           </a:p>
         </p:txBody>
       </p:sp>
@@ -3234,7 +3270,7 @@
               <a:rPr lang="en-IN" smtClean="0"/>
               <a:t>15-12-2024</a:t>
             </a:fld>
-            <a:endParaRPr lang="en-IN"/>
+            <a:endParaRPr lang="en-IN" dirty="0"/>
           </a:p>
         </p:txBody>
       </p:sp>
@@ -3253,7 +3289,7 @@
           <a:bodyPr/>
           <a:lstStyle/>
           <a:p>
-            <a:endParaRPr lang="en-IN"/>
+            <a:endParaRPr lang="en-IN" dirty="0"/>
           </a:p>
         </p:txBody>
       </p:sp>
@@ -3276,7 +3312,7 @@
               <a:rPr lang="en-IN" smtClean="0"/>
               <a:t>‹#›</a:t>
             </a:fld>
-            <a:endParaRPr lang="en-IN"/>
+            <a:endParaRPr lang="en-IN" dirty="0"/>
           </a:p>
         </p:txBody>
       </p:sp>
@@ -3414,7 +3450,7 @@
               <a:rPr lang="en-IN" smtClean="0"/>
               <a:t>15-12-2024</a:t>
             </a:fld>
-            <a:endParaRPr lang="en-IN"/>
+            <a:endParaRPr lang="en-IN" dirty="0"/>
           </a:p>
         </p:txBody>
       </p:sp>
@@ -3433,7 +3469,7 @@
           <a:bodyPr/>
           <a:lstStyle/>
           <a:p>
-            <a:endParaRPr lang="en-IN"/>
+            <a:endParaRPr lang="en-IN" dirty="0"/>
           </a:p>
         </p:txBody>
       </p:sp>
@@ -3456,7 +3492,7 @@
               <a:rPr lang="en-IN" smtClean="0"/>
               <a:t>‹#›</a:t>
             </a:fld>
-            <a:endParaRPr lang="en-IN"/>
+            <a:endParaRPr lang="en-IN" dirty="0"/>
           </a:p>
         </p:txBody>
       </p:sp>
@@ -3584,7 +3620,7 @@
               <a:rPr lang="en-IN" smtClean="0"/>
               <a:t>15-12-2024</a:t>
             </a:fld>
-            <a:endParaRPr lang="en-IN"/>
+            <a:endParaRPr lang="en-IN" dirty="0"/>
           </a:p>
         </p:txBody>
       </p:sp>
@@ -3603,7 +3639,7 @@
           <a:bodyPr/>
           <a:lstStyle/>
           <a:p>
-            <a:endParaRPr lang="en-IN"/>
+            <a:endParaRPr lang="en-IN" dirty="0"/>
           </a:p>
         </p:txBody>
       </p:sp>
@@ -3626,7 +3662,7 @@
               <a:rPr lang="en-IN" smtClean="0"/>
               <a:t>‹#›</a:t>
             </a:fld>
-            <a:endParaRPr lang="en-IN"/>
+            <a:endParaRPr lang="en-IN" dirty="0"/>
           </a:p>
         </p:txBody>
       </p:sp>
@@ -3831,7 +3867,7 @@
               <a:rPr lang="en-IN" smtClean="0"/>
               <a:t>15-12-2024</a:t>
             </a:fld>
-            <a:endParaRPr lang="en-IN"/>
+            <a:endParaRPr lang="en-IN" dirty="0"/>
           </a:p>
         </p:txBody>
       </p:sp>
@@ -3850,7 +3886,7 @@
           <a:bodyPr/>
           <a:lstStyle/>
           <a:p>
-            <a:endParaRPr lang="en-IN"/>
+            <a:endParaRPr lang="en-IN" dirty="0"/>
           </a:p>
         </p:txBody>
       </p:sp>
@@ -3873,7 +3909,7 @@
               <a:rPr lang="en-IN" smtClean="0"/>
               <a:t>‹#›</a:t>
             </a:fld>
-            <a:endParaRPr lang="en-IN"/>
+            <a:endParaRPr lang="en-IN" dirty="0"/>
           </a:p>
         </p:txBody>
       </p:sp>
@@ -4123,7 +4159,7 @@
               <a:rPr lang="en-IN" smtClean="0"/>
               <a:t>15-12-2024</a:t>
             </a:fld>
-            <a:endParaRPr lang="en-IN"/>
+            <a:endParaRPr lang="en-IN" dirty="0"/>
           </a:p>
         </p:txBody>
       </p:sp>
@@ -4142,7 +4178,7 @@
           <a:bodyPr/>
           <a:lstStyle/>
           <a:p>
-            <a:endParaRPr lang="en-IN"/>
+            <a:endParaRPr lang="en-IN" dirty="0"/>
           </a:p>
         </p:txBody>
       </p:sp>
@@ -4165,7 +4201,7 @@
               <a:rPr lang="en-IN" smtClean="0"/>
               <a:t>‹#›</a:t>
             </a:fld>
-            <a:endParaRPr lang="en-IN"/>
+            <a:endParaRPr lang="en-IN" dirty="0"/>
           </a:p>
         </p:txBody>
       </p:sp>
@@ -4567,7 +4603,7 @@
               <a:rPr lang="en-IN" smtClean="0"/>
               <a:t>15-12-2024</a:t>
             </a:fld>
-            <a:endParaRPr lang="en-IN"/>
+            <a:endParaRPr lang="en-IN" dirty="0"/>
           </a:p>
         </p:txBody>
       </p:sp>
@@ -4586,7 +4622,7 @@
           <a:bodyPr/>
           <a:lstStyle/>
           <a:p>
-            <a:endParaRPr lang="en-IN"/>
+            <a:endParaRPr lang="en-IN" dirty="0"/>
           </a:p>
         </p:txBody>
       </p:sp>
@@ -4609,7 +4645,7 @@
               <a:rPr lang="en-IN" smtClean="0"/>
               <a:t>‹#›</a:t>
             </a:fld>
-            <a:endParaRPr lang="en-IN"/>
+            <a:endParaRPr lang="en-IN" dirty="0"/>
           </a:p>
         </p:txBody>
       </p:sp>
@@ -4685,7 +4721,7 @@
               <a:rPr lang="en-IN" smtClean="0"/>
               <a:t>15-12-2024</a:t>
             </a:fld>
-            <a:endParaRPr lang="en-IN"/>
+            <a:endParaRPr lang="en-IN" dirty="0"/>
           </a:p>
         </p:txBody>
       </p:sp>
@@ -4704,7 +4740,7 @@
           <a:bodyPr/>
           <a:lstStyle/>
           <a:p>
-            <a:endParaRPr lang="en-IN"/>
+            <a:endParaRPr lang="en-IN" dirty="0"/>
           </a:p>
         </p:txBody>
       </p:sp>
@@ -4727,7 +4763,7 @@
               <a:rPr lang="en-IN" smtClean="0"/>
               <a:t>‹#›</a:t>
             </a:fld>
-            <a:endParaRPr lang="en-IN"/>
+            <a:endParaRPr lang="en-IN" dirty="0"/>
           </a:p>
         </p:txBody>
       </p:sp>
@@ -4780,7 +4816,7 @@
               <a:rPr lang="en-IN" smtClean="0"/>
               <a:t>15-12-2024</a:t>
             </a:fld>
-            <a:endParaRPr lang="en-IN"/>
+            <a:endParaRPr lang="en-IN" dirty="0"/>
           </a:p>
         </p:txBody>
       </p:sp>
@@ -4799,7 +4835,7 @@
           <a:bodyPr/>
           <a:lstStyle/>
           <a:p>
-            <a:endParaRPr lang="en-IN"/>
+            <a:endParaRPr lang="en-IN" dirty="0"/>
           </a:p>
         </p:txBody>
       </p:sp>
@@ -4822,7 +4858,7 @@
               <a:rPr lang="en-IN" smtClean="0"/>
               <a:t>‹#›</a:t>
             </a:fld>
-            <a:endParaRPr lang="en-IN"/>
+            <a:endParaRPr lang="en-IN" dirty="0"/>
           </a:p>
         </p:txBody>
       </p:sp>
@@ -5059,7 +5095,7 @@
               <a:rPr lang="en-IN" smtClean="0"/>
               <a:t>15-12-2024</a:t>
             </a:fld>
-            <a:endParaRPr lang="en-IN"/>
+            <a:endParaRPr lang="en-IN" dirty="0"/>
           </a:p>
         </p:txBody>
       </p:sp>
@@ -5078,7 +5114,7 @@
           <a:bodyPr/>
           <a:lstStyle/>
           <a:p>
-            <a:endParaRPr lang="en-IN"/>
+            <a:endParaRPr lang="en-IN" dirty="0"/>
           </a:p>
         </p:txBody>
       </p:sp>
@@ -5101,7 +5137,7 @@
               <a:rPr lang="en-IN" smtClean="0"/>
               <a:t>‹#›</a:t>
             </a:fld>
-            <a:endParaRPr lang="en-IN"/>
+            <a:endParaRPr lang="en-IN" dirty="0"/>
           </a:p>
         </p:txBody>
       </p:sp>
@@ -5241,10 +5277,9 @@
           </a:lstStyle>
           <a:p>
             <a:r>
-              <a:rPr lang="en-US"/>
+              <a:rPr lang="en-US" dirty="0"/>
               <a:t>Click icon to add picture</a:t>
             </a:r>
-            <a:endParaRPr lang="en-US" dirty="0"/>
           </a:p>
         </p:txBody>
       </p:sp>
@@ -5334,7 +5369,7 @@
               <a:rPr lang="en-IN" smtClean="0"/>
               <a:t>15-12-2024</a:t>
             </a:fld>
-            <a:endParaRPr lang="en-IN"/>
+            <a:endParaRPr lang="en-IN" dirty="0"/>
           </a:p>
         </p:txBody>
       </p:sp>
@@ -5353,7 +5388,7 @@
           <a:bodyPr/>
           <a:lstStyle/>
           <a:p>
-            <a:endParaRPr lang="en-IN"/>
+            <a:endParaRPr lang="en-IN" dirty="0"/>
           </a:p>
         </p:txBody>
       </p:sp>
@@ -5376,7 +5411,7 @@
               <a:rPr lang="en-IN" smtClean="0"/>
               <a:t>‹#›</a:t>
             </a:fld>
-            <a:endParaRPr lang="en-IN"/>
+            <a:endParaRPr lang="en-IN" dirty="0"/>
           </a:p>
         </p:txBody>
       </p:sp>
@@ -5763,7 +5798,7 @@
               <a:rPr lang="en-IN" smtClean="0"/>
               <a:t>15-12-2024</a:t>
             </a:fld>
-            <a:endParaRPr lang="en-IN"/>
+            <a:endParaRPr lang="en-IN" dirty="0"/>
           </a:p>
         </p:txBody>
       </p:sp>
@@ -5801,7 +5836,7 @@
             </a:lvl1pPr>
           </a:lstStyle>
           <a:p>
-            <a:endParaRPr lang="en-IN"/>
+            <a:endParaRPr lang="en-IN" dirty="0"/>
           </a:p>
         </p:txBody>
       </p:sp>
@@ -5842,7 +5877,7 @@
               <a:rPr lang="en-IN" smtClean="0"/>
               <a:t>‹#›</a:t>
             </a:fld>
-            <a:endParaRPr lang="en-IN"/>
+            <a:endParaRPr lang="en-IN" dirty="0"/>
           </a:p>
         </p:txBody>
       </p:sp>
@@ -6411,21 +6446,7 @@
                 <a:latin typeface="Times New Roman" panose="02020603050405020304" pitchFamily="18" charset="0"/>
                 <a:cs typeface="Times New Roman" panose="02020603050405020304" pitchFamily="18" charset="0"/>
               </a:rPr>
-              <a:t>Trees) for predicting numeric values. We selected two datasets, namely, colleges (large, high dimensional with missing values) and real estate valuation (small, low dimensional and no missing value). The colleges dataset has 51 attributes which are numeric, ordinal and nominal. The target attribute is taken as “</a:t>
-            </a:r>
-            <a:r>
-              <a:rPr lang="en-US" sz="2000" cap="none" dirty="0" err="1">
-                <a:latin typeface="Times New Roman" panose="02020603050405020304" pitchFamily="18" charset="0"/>
-                <a:cs typeface="Times New Roman" panose="02020603050405020304" pitchFamily="18" charset="0"/>
-              </a:rPr>
-              <a:t>percent_pell_grant</a:t>
-            </a:r>
-            <a:r>
-              <a:rPr lang="en-US" sz="2000" cap="none" dirty="0">
-                <a:latin typeface="Times New Roman" panose="02020603050405020304" pitchFamily="18" charset="0"/>
-                <a:cs typeface="Times New Roman" panose="02020603050405020304" pitchFamily="18" charset="0"/>
-              </a:rPr>
-              <a:t>”. The real estate valuation dataset has 8 attributes which are all numeric and the target attribute is “Y house price of unit area</a:t>
+              <a:t>Trees) for predicting numeric values. We selected two datasets, namely, colleges (large, high dimensional with missing values) and real estate valuation (small, low dimensional and no missing value). The colleges dataset has 51 attributes which are numeric, ordinal and nominal. The target attribute is taken as “percent_pell_grant”. The real estate valuation dataset has 8 attributes which are all numeric and the target attribute is “Y house price of unit area</a:t>
             </a:r>
             <a:r>
               <a:rPr lang="en-US" sz="2000" dirty="0">
@@ -6494,18 +6515,11 @@
           <a:p>
             <a:pPr algn="l"/>
             <a:r>
-              <a:rPr lang="en-IN" sz="2000" b="0" i="0" u="none" strike="noStrike" baseline="0" dirty="0" err="1">
-                <a:latin typeface="Times New Roman" panose="02020603050405020304" pitchFamily="18" charset="0"/>
-                <a:cs typeface="Times New Roman" panose="02020603050405020304" pitchFamily="18" charset="0"/>
-              </a:rPr>
-              <a:t>Haubenburger</a:t>
-            </a:r>
-            <a:r>
               <a:rPr lang="en-IN" sz="2000" b="0" i="0" u="none" strike="noStrike" baseline="0" dirty="0">
                 <a:latin typeface="Times New Roman" panose="02020603050405020304" pitchFamily="18" charset="0"/>
                 <a:cs typeface="Times New Roman" panose="02020603050405020304" pitchFamily="18" charset="0"/>
               </a:rPr>
-              <a:t> Gabriel (11840531)</a:t>
+              <a:t>Haubenburger Gabriel (11840531)</a:t>
             </a:r>
             <a:endParaRPr lang="en-IN" sz="2000" dirty="0">
               <a:latin typeface="Times New Roman" panose="02020603050405020304" pitchFamily="18" charset="0"/>
@@ -6605,10 +6619,9 @@
           <a:lstStyle/>
           <a:p>
             <a:r>
-              <a:rPr lang="de-DE" dirty="0" err="1"/>
+              <a:rPr lang="en-US" dirty="0"/>
               <a:t>Conclusion</a:t>
             </a:r>
-            <a:endParaRPr lang="de-AT" dirty="0"/>
           </a:p>
         </p:txBody>
       </p:sp>
@@ -6633,7 +6646,7 @@
           <a:bodyPr/>
           <a:lstStyle/>
           <a:p>
-            <a:endParaRPr lang="de-AT"/>
+            <a:endParaRPr lang="de-AT" dirty="0"/>
           </a:p>
         </p:txBody>
       </p:sp>
@@ -6688,7 +6701,7 @@
           <a:bodyPr/>
           <a:lstStyle/>
           <a:p>
-            <a:endParaRPr lang="de-AT"/>
+            <a:endParaRPr lang="de-AT" dirty="0"/>
           </a:p>
         </p:txBody>
       </p:sp>
@@ -6713,7 +6726,7 @@
           <a:bodyPr/>
           <a:lstStyle/>
           <a:p>
-            <a:endParaRPr lang="de-AT"/>
+            <a:endParaRPr lang="de-AT" dirty="0"/>
           </a:p>
         </p:txBody>
       </p:sp>
@@ -6768,7 +6781,7 @@
           <a:bodyPr/>
           <a:lstStyle/>
           <a:p>
-            <a:endParaRPr lang="de-AT"/>
+            <a:endParaRPr lang="de-AT" dirty="0"/>
           </a:p>
         </p:txBody>
       </p:sp>
@@ -6793,7 +6806,7 @@
           <a:bodyPr/>
           <a:lstStyle/>
           <a:p>
-            <a:endParaRPr lang="de-AT"/>
+            <a:endParaRPr lang="de-AT" dirty="0"/>
           </a:p>
         </p:txBody>
       </p:sp>
@@ -6848,7 +6861,7 @@
           <a:bodyPr/>
           <a:lstStyle/>
           <a:p>
-            <a:endParaRPr lang="de-AT"/>
+            <a:endParaRPr lang="de-AT" dirty="0"/>
           </a:p>
         </p:txBody>
       </p:sp>
@@ -6873,7 +6886,7 @@
           <a:bodyPr/>
           <a:lstStyle/>
           <a:p>
-            <a:endParaRPr lang="de-AT"/>
+            <a:endParaRPr lang="de-AT" dirty="0"/>
           </a:p>
         </p:txBody>
       </p:sp>
@@ -6928,7 +6941,7 @@
           <a:bodyPr/>
           <a:lstStyle/>
           <a:p>
-            <a:endParaRPr lang="de-AT"/>
+            <a:endParaRPr lang="de-AT" dirty="0"/>
           </a:p>
         </p:txBody>
       </p:sp>
@@ -6953,7 +6966,7 @@
           <a:bodyPr/>
           <a:lstStyle/>
           <a:p>
-            <a:endParaRPr lang="de-AT"/>
+            <a:endParaRPr lang="de-AT" dirty="0"/>
           </a:p>
         </p:txBody>
       </p:sp>
@@ -7008,7 +7021,7 @@
           <a:bodyPr/>
           <a:lstStyle/>
           <a:p>
-            <a:endParaRPr lang="de-AT"/>
+            <a:endParaRPr lang="de-AT" dirty="0"/>
           </a:p>
         </p:txBody>
       </p:sp>
@@ -7033,7 +7046,7 @@
           <a:bodyPr/>
           <a:lstStyle/>
           <a:p>
-            <a:endParaRPr lang="de-AT"/>
+            <a:endParaRPr lang="de-AT" dirty="0"/>
           </a:p>
         </p:txBody>
       </p:sp>
@@ -7116,7 +7129,58 @@
           <a:bodyPr/>
           <a:lstStyle/>
           <a:p>
-            <a:endParaRPr lang="en-IN"/>
+            <a:r>
+              <a:rPr lang="en-IN" dirty="0"/>
+              <a:t>Real Estate Valuation</a:t>
+            </a:r>
+          </a:p>
+          <a:p>
+            <a:pPr lvl="1"/>
+            <a:r>
+              <a:rPr lang="en-IN" dirty="0"/>
+              <a:t>6 features + target</a:t>
+            </a:r>
+          </a:p>
+          <a:p>
+            <a:pPr lvl="1"/>
+            <a:r>
+              <a:rPr lang="en-IN" dirty="0"/>
+              <a:t>414 instances</a:t>
+            </a:r>
+          </a:p>
+          <a:p>
+            <a:r>
+              <a:rPr lang="en-IN" dirty="0"/>
+              <a:t>Colleges</a:t>
+            </a:r>
+          </a:p>
+          <a:p>
+            <a:pPr lvl="1"/>
+            <a:r>
+              <a:rPr lang="en-IN" dirty="0"/>
+              <a:t>48 features</a:t>
+            </a:r>
+          </a:p>
+          <a:p>
+            <a:pPr lvl="1"/>
+            <a:r>
+              <a:rPr lang="en-IN" dirty="0"/>
+              <a:t>7063 instances</a:t>
+            </a:r>
+          </a:p>
+          <a:p>
+            <a:pPr lvl="1"/>
+            <a:r>
+              <a:rPr lang="en-IN" dirty="0"/>
+              <a:t>Large number of missing values</a:t>
+            </a:r>
+          </a:p>
+          <a:p>
+            <a:pPr lvl="1"/>
+            <a:endParaRPr lang="en-IN" dirty="0"/>
+          </a:p>
+          <a:p>
+            <a:endParaRPr lang="en-IN" dirty="0"/>
           </a:p>
         </p:txBody>
       </p:sp>
@@ -7172,10 +7236,9 @@
           <a:lstStyle/>
           <a:p>
             <a:r>
-              <a:rPr lang="de-DE" dirty="0" err="1"/>
+              <a:rPr lang="en-US" dirty="0"/>
               <a:t>Preprocessing</a:t>
             </a:r>
-            <a:endParaRPr lang="de-AT" dirty="0"/>
           </a:p>
         </p:txBody>
       </p:sp>
@@ -7200,7 +7263,30 @@
           <a:bodyPr/>
           <a:lstStyle/>
           <a:p>
-            <a:endParaRPr lang="de-AT"/>
+            <a:r>
+              <a:rPr lang="en-US" dirty="0"/>
+              <a:t>For Real Estate Valuation:</a:t>
+            </a:r>
+          </a:p>
+          <a:p>
+            <a:pPr lvl="1"/>
+            <a:r>
+              <a:rPr lang="en-US" dirty="0"/>
+              <a:t>Text</a:t>
+            </a:r>
+          </a:p>
+          <a:p>
+            <a:r>
+              <a:rPr lang="en-US" dirty="0"/>
+              <a:t>For Colleges:</a:t>
+            </a:r>
+          </a:p>
+          <a:p>
+            <a:pPr lvl="1"/>
+            <a:r>
+              <a:rPr lang="en-US" dirty="0"/>
+              <a:t>Text</a:t>
+            </a:r>
           </a:p>
         </p:txBody>
       </p:sp>
@@ -7256,7 +7342,7 @@
           <a:lstStyle/>
           <a:p>
             <a:r>
-              <a:rPr lang="de-DE" dirty="0" err="1"/>
+              <a:rPr lang="en-US" dirty="0"/>
               <a:t>Decision</a:t>
             </a:r>
             <a:r>
@@ -7264,7 +7350,7 @@
               <a:t> </a:t>
             </a:r>
             <a:r>
-              <a:rPr lang="de-DE" dirty="0" err="1"/>
+              <a:rPr lang="en-US" dirty="0"/>
               <a:t>Tree</a:t>
             </a:r>
             <a:r>
@@ -7296,7 +7382,10 @@
           <a:bodyPr/>
           <a:lstStyle/>
           <a:p>
-            <a:endParaRPr lang="de-AT"/>
+            <a:r>
+              <a:rPr lang="en-US" dirty="0"/>
+              <a:t>A variant of the simple decision tree model for regression tasks</a:t>
+            </a:r>
           </a:p>
         </p:txBody>
       </p:sp>
@@ -7380,7 +7469,16 @@
           <a:bodyPr/>
           <a:lstStyle/>
           <a:p>
-            <a:endParaRPr lang="de-AT"/>
+            <a:r>
+              <a:rPr lang="en-US" dirty="0"/>
+              <a:t>Uses multiple decision trees trained on random subsets of the whole data set</a:t>
+            </a:r>
+          </a:p>
+          <a:p>
+            <a:r>
+              <a:rPr lang="en-US" dirty="0"/>
+              <a:t>Counters inherent instability of decision trees</a:t>
+            </a:r>
           </a:p>
         </p:txBody>
       </p:sp>
@@ -7440,10 +7538,9 @@
               <a:t>Hyperparameter </a:t>
             </a:r>
             <a:r>
-              <a:rPr lang="de-DE" dirty="0" err="1"/>
+              <a:rPr lang="en-US" dirty="0"/>
               <a:t>optimization</a:t>
             </a:r>
-            <a:endParaRPr lang="de-AT" dirty="0"/>
           </a:p>
         </p:txBody>
       </p:sp>
@@ -7468,7 +7565,7 @@
           <a:bodyPr/>
           <a:lstStyle/>
           <a:p>
-            <a:endParaRPr lang="de-AT"/>
+            <a:endParaRPr lang="de-AT" dirty="0"/>
           </a:p>
         </p:txBody>
       </p:sp>
@@ -7524,46 +7621,9 @@
           <a:lstStyle/>
           <a:p>
             <a:r>
-              <a:rPr lang="de-DE" dirty="0" err="1"/>
-              <a:t>Comparison</a:t>
-            </a:r>
-            <a:r>
-              <a:rPr lang="de-DE" dirty="0"/>
-              <a:t> </a:t>
-            </a:r>
-            <a:r>
-              <a:rPr lang="de-DE" dirty="0" err="1"/>
-              <a:t>to</a:t>
-            </a:r>
-            <a:r>
-              <a:rPr lang="de-DE" dirty="0"/>
-              <a:t> </a:t>
-            </a:r>
-            <a:r>
-              <a:rPr lang="de-DE" dirty="0" err="1"/>
-              <a:t>scikit</a:t>
-            </a:r>
-            <a:r>
-              <a:rPr lang="de-DE" dirty="0"/>
-              <a:t> </a:t>
-            </a:r>
-            <a:r>
-              <a:rPr lang="de-DE" dirty="0" err="1"/>
-              <a:t>learn</a:t>
-            </a:r>
-            <a:r>
-              <a:rPr lang="de-DE" dirty="0"/>
-              <a:t> </a:t>
-            </a:r>
-            <a:r>
-              <a:rPr lang="de-DE" dirty="0" err="1"/>
-              <a:t>DecisionTreeRegressor</a:t>
-            </a:r>
-            <a:r>
-              <a:rPr lang="de-DE" dirty="0"/>
-              <a:t> </a:t>
-            </a:r>
-            <a:endParaRPr lang="de-AT" dirty="0"/>
+              <a:rPr lang="en-US" dirty="0"/>
+              <a:t>Comparison to scikit learn DecisionTreeRegressor </a:t>
+            </a:r>
           </a:p>
         </p:txBody>
       </p:sp>
@@ -7588,7 +7648,7 @@
           <a:bodyPr/>
           <a:lstStyle/>
           <a:p>
-            <a:endParaRPr lang="de-AT"/>
+            <a:endParaRPr lang="de-AT" dirty="0"/>
           </a:p>
         </p:txBody>
       </p:sp>
@@ -7652,7 +7712,7 @@
               <a:t> </a:t>
             </a:r>
             <a:r>
-              <a:rPr lang="de-DE" dirty="0" err="1"/>
+              <a:rPr lang="en-US" dirty="0"/>
               <a:t>to</a:t>
             </a:r>
             <a:r>
@@ -7660,24 +7720,12 @@
               <a:t> </a:t>
             </a:r>
             <a:r>
-              <a:rPr lang="de-DE" dirty="0" err="1"/>
-              <a:t>scikit</a:t>
+              <a:rPr lang="en-US" dirty="0"/>
+              <a:t>scikit-learn</a:t>
             </a:r>
             <a:r>
               <a:rPr lang="de-DE" dirty="0"/>
-              <a:t> </a:t>
-            </a:r>
-            <a:r>
-              <a:rPr lang="de-DE" dirty="0" err="1"/>
-              <a:t>learn</a:t>
-            </a:r>
-            <a:r>
-              <a:rPr lang="de-DE" dirty="0"/>
-              <a:t> </a:t>
-            </a:r>
-            <a:r>
-              <a:rPr lang="de-DE" dirty="0" err="1"/>
-              <a:t>RandomForestRegressor</a:t>
+              <a:t> RandomForestRegressor</a:t>
             </a:r>
             <a:endParaRPr lang="de-AT" dirty="0"/>
           </a:p>
@@ -7704,7 +7752,7 @@
           <a:bodyPr/>
           <a:lstStyle/>
           <a:p>
-            <a:endParaRPr lang="de-AT"/>
+            <a:endParaRPr lang="de-AT" dirty="0"/>
           </a:p>
         </p:txBody>
       </p:sp>
@@ -7760,26 +7808,9 @@
           <a:lstStyle/>
           <a:p>
             <a:r>
-              <a:rPr lang="de-DE" dirty="0" err="1"/>
-              <a:t>Comparison</a:t>
-            </a:r>
-            <a:r>
-              <a:rPr lang="de-DE" dirty="0"/>
-              <a:t> </a:t>
-            </a:r>
-            <a:r>
-              <a:rPr lang="de-DE" dirty="0" err="1"/>
-              <a:t>to</a:t>
-            </a:r>
-            <a:r>
-              <a:rPr lang="de-DE" dirty="0"/>
-              <a:t> LLM </a:t>
-            </a:r>
-            <a:r>
-              <a:rPr lang="de-DE" dirty="0" err="1"/>
-              <a:t>version</a:t>
-            </a:r>
-            <a:endParaRPr lang="de-AT" dirty="0"/>
+              <a:rPr lang="en-US" dirty="0"/>
+              <a:t>Comparison to LLM version</a:t>
+            </a:r>
           </a:p>
         </p:txBody>
       </p:sp>
@@ -7804,7 +7835,7 @@
           <a:bodyPr/>
           <a:lstStyle/>
           <a:p>
-            <a:endParaRPr lang="de-AT"/>
+            <a:endParaRPr lang="de-AT" dirty="0"/>
           </a:p>
         </p:txBody>
       </p:sp>

</xml_diff>

<commit_message>
added some comments to code
</commit_message>
<xml_diff>
--- a/ex2/Exercise_2_ppt.pptx
+++ b/ex2/Exercise_2_ppt.pptx
@@ -15,12 +15,12 @@
     <p:sldId id="264" r:id="rId9"/>
     <p:sldId id="262" r:id="rId10"/>
     <p:sldId id="263" r:id="rId11"/>
-    <p:sldId id="265" r:id="rId12"/>
-    <p:sldId id="266" r:id="rId13"/>
+    <p:sldId id="266" r:id="rId12"/>
+    <p:sldId id="265" r:id="rId13"/>
     <p:sldId id="267" r:id="rId14"/>
     <p:sldId id="268" r:id="rId15"/>
     <p:sldId id="269" r:id="rId16"/>
-    <p:sldId id="270" r:id="rId17"/>
+    <p:sldId id="272" r:id="rId17"/>
   </p:sldIdLst>
   <p:sldSz cx="12192000" cy="6858000"/>
   <p:notesSz cx="6858000" cy="9144000"/>
@@ -139,8 +139,8 @@
 <pc:chgInfo xmlns:a="http://schemas.openxmlformats.org/drawingml/2006/main" xmlns:r="http://schemas.openxmlformats.org/officeDocument/2006/relationships" xmlns:ac="http://schemas.microsoft.com/office/drawing/2013/main/command" xmlns:pc="http://schemas.microsoft.com/office/powerpoint/2013/main/command">
   <pc:docChgLst>
     <pc:chgData name="Haubenburger, Gabriel" userId="d79be2aa-0303-4748-b5e6-c8202455e92e" providerId="ADAL" clId="{C41F04A2-1B58-4C51-987F-CBD3CF99D29E}"/>
-    <pc:docChg chg="undo custSel addSld modSld sldOrd">
-      <pc:chgData name="Haubenburger, Gabriel" userId="d79be2aa-0303-4748-b5e6-c8202455e92e" providerId="ADAL" clId="{C41F04A2-1B58-4C51-987F-CBD3CF99D29E}" dt="2024-12-15T18:37:24.439" v="753" actId="20577"/>
+    <pc:docChg chg="undo custSel addSld delSld modSld sldOrd">
+      <pc:chgData name="Haubenburger, Gabriel" userId="d79be2aa-0303-4748-b5e6-c8202455e92e" providerId="ADAL" clId="{C41F04A2-1B58-4C51-987F-CBD3CF99D29E}" dt="2024-12-15T19:19:26.942" v="1117" actId="20577"/>
       <pc:docMkLst>
         <pc:docMk/>
       </pc:docMkLst>
@@ -213,8 +213,8 @@
           </ac:spMkLst>
         </pc:spChg>
       </pc:sldChg>
-      <pc:sldChg chg="modSp new mod ord">
-        <pc:chgData name="Haubenburger, Gabriel" userId="d79be2aa-0303-4748-b5e6-c8202455e92e" providerId="ADAL" clId="{C41F04A2-1B58-4C51-987F-CBD3CF99D29E}" dt="2024-12-15T18:34:39.875" v="470" actId="790"/>
+      <pc:sldChg chg="modSp new mod ord modShow">
+        <pc:chgData name="Haubenburger, Gabriel" userId="d79be2aa-0303-4748-b5e6-c8202455e92e" providerId="ADAL" clId="{C41F04A2-1B58-4C51-987F-CBD3CF99D29E}" dt="2024-12-15T19:14:33.468" v="769" actId="729"/>
         <pc:sldMkLst>
           <pc:docMk/>
           <pc:sldMk cId="156605029" sldId="260"/>
@@ -237,7 +237,7 @@
         </pc:spChg>
       </pc:sldChg>
       <pc:sldChg chg="modSp new mod">
-        <pc:chgData name="Haubenburger, Gabriel" userId="d79be2aa-0303-4748-b5e6-c8202455e92e" providerId="ADAL" clId="{C41F04A2-1B58-4C51-987F-CBD3CF99D29E}" dt="2024-12-15T18:33:12.835" v="463" actId="790"/>
+        <pc:chgData name="Haubenburger, Gabriel" userId="d79be2aa-0303-4748-b5e6-c8202455e92e" providerId="ADAL" clId="{C41F04A2-1B58-4C51-987F-CBD3CF99D29E}" dt="2024-12-15T19:19:26.942" v="1117" actId="20577"/>
         <pc:sldMkLst>
           <pc:docMk/>
           <pc:sldMk cId="2778680789" sldId="261"/>
@@ -248,6 +248,14 @@
             <pc:docMk/>
             <pc:sldMk cId="2778680789" sldId="261"/>
             <ac:spMk id="2" creationId="{DC99B76B-690A-D473-6489-8EBA89769C27}"/>
+          </ac:spMkLst>
+        </pc:spChg>
+        <pc:spChg chg="mod">
+          <ac:chgData name="Haubenburger, Gabriel" userId="d79be2aa-0303-4748-b5e6-c8202455e92e" providerId="ADAL" clId="{C41F04A2-1B58-4C51-987F-CBD3CF99D29E}" dt="2024-12-15T19:19:26.942" v="1117" actId="20577"/>
+          <ac:spMkLst>
+            <pc:docMk/>
+            <pc:sldMk cId="2778680789" sldId="261"/>
+            <ac:spMk id="3" creationId="{0A9D697E-4ADF-2F55-0E09-4F1AB55C3465}"/>
           </ac:spMkLst>
         </pc:spChg>
       </pc:sldChg>
@@ -296,8 +304,8 @@
           </ac:spMkLst>
         </pc:spChg>
       </pc:sldChg>
-      <pc:sldChg chg="modSp new mod">
-        <pc:chgData name="Haubenburger, Gabriel" userId="d79be2aa-0303-4748-b5e6-c8202455e92e" providerId="ADAL" clId="{C41F04A2-1B58-4C51-987F-CBD3CF99D29E}" dt="2024-12-15T18:34:00.480" v="466" actId="790"/>
+      <pc:sldChg chg="modSp new mod ord">
+        <pc:chgData name="Haubenburger, Gabriel" userId="d79be2aa-0303-4748-b5e6-c8202455e92e" providerId="ADAL" clId="{C41F04A2-1B58-4C51-987F-CBD3CF99D29E}" dt="2024-12-15T19:14:17.815" v="767"/>
         <pc:sldMkLst>
           <pc:docMk/>
           <pc:sldMk cId="3637246051" sldId="265"/>
@@ -311,12 +319,20 @@
           </ac:spMkLst>
         </pc:spChg>
       </pc:sldChg>
-      <pc:sldChg chg="new">
-        <pc:chgData name="Haubenburger, Gabriel" userId="d79be2aa-0303-4748-b5e6-c8202455e92e" providerId="ADAL" clId="{C41F04A2-1B58-4C51-987F-CBD3CF99D29E}" dt="2024-12-15T14:36:14.718" v="8" actId="680"/>
+      <pc:sldChg chg="modSp new mod">
+        <pc:chgData name="Haubenburger, Gabriel" userId="d79be2aa-0303-4748-b5e6-c8202455e92e" providerId="ADAL" clId="{C41F04A2-1B58-4C51-987F-CBD3CF99D29E}" dt="2024-12-15T19:14:09.238" v="765" actId="20577"/>
         <pc:sldMkLst>
           <pc:docMk/>
           <pc:sldMk cId="1764173400" sldId="266"/>
         </pc:sldMkLst>
+        <pc:spChg chg="mod">
+          <ac:chgData name="Haubenburger, Gabriel" userId="d79be2aa-0303-4748-b5e6-c8202455e92e" providerId="ADAL" clId="{C41F04A2-1B58-4C51-987F-CBD3CF99D29E}" dt="2024-12-15T19:14:09.238" v="765" actId="20577"/>
+          <ac:spMkLst>
+            <pc:docMk/>
+            <pc:sldMk cId="1764173400" sldId="266"/>
+            <ac:spMk id="2" creationId="{F2828560-3281-7AA8-FACE-BE9A95FCF4EE}"/>
+          </ac:spMkLst>
+        </pc:spChg>
       </pc:sldChg>
       <pc:sldChg chg="new">
         <pc:chgData name="Haubenburger, Gabriel" userId="d79be2aa-0303-4748-b5e6-c8202455e92e" providerId="ADAL" clId="{C41F04A2-1B58-4C51-987F-CBD3CF99D29E}" dt="2024-12-15T14:36:15.125" v="9" actId="680"/>
@@ -339,11 +355,18 @@
           <pc:sldMk cId="2731784210" sldId="269"/>
         </pc:sldMkLst>
       </pc:sldChg>
-      <pc:sldChg chg="new">
-        <pc:chgData name="Haubenburger, Gabriel" userId="d79be2aa-0303-4748-b5e6-c8202455e92e" providerId="ADAL" clId="{C41F04A2-1B58-4C51-987F-CBD3CF99D29E}" dt="2024-12-15T14:36:16.829" v="12" actId="680"/>
+      <pc:sldChg chg="new del">
+        <pc:chgData name="Haubenburger, Gabriel" userId="d79be2aa-0303-4748-b5e6-c8202455e92e" providerId="ADAL" clId="{C41F04A2-1B58-4C51-987F-CBD3CF99D29E}" dt="2024-12-15T19:14:23.976" v="768" actId="47"/>
         <pc:sldMkLst>
           <pc:docMk/>
           <pc:sldMk cId="2077306566" sldId="270"/>
+        </pc:sldMkLst>
+      </pc:sldChg>
+      <pc:sldChg chg="new">
+        <pc:chgData name="Haubenburger, Gabriel" userId="d79be2aa-0303-4748-b5e6-c8202455e92e" providerId="ADAL" clId="{C41F04A2-1B58-4C51-987F-CBD3CF99D29E}" dt="2024-12-15T19:14:38.309" v="770" actId="680"/>
+        <pc:sldMkLst>
+          <pc:docMk/>
+          <pc:sldMk cId="952875972" sldId="272"/>
         </pc:sldMkLst>
       </pc:sldChg>
     </pc:docChg>
@@ -6686,7 +6709,7 @@
           <p:cNvPr id="2" name="Title 1">
             <a:extLst>
               <a:ext uri="{FF2B5EF4-FFF2-40B4-BE49-F238E27FC236}">
-                <a16:creationId xmlns:a16="http://schemas.microsoft.com/office/drawing/2014/main" id="{4D54CD70-A7C7-B159-DB36-DD35BB897E4A}"/>
+                <a16:creationId xmlns:a16="http://schemas.microsoft.com/office/drawing/2014/main" id="{F2828560-3281-7AA8-FACE-BE9A95FCF4EE}"/>
               </a:ext>
             </a:extLst>
           </p:cNvPr>
@@ -6703,8 +6726,8 @@
           <a:lstStyle/>
           <a:p>
             <a:r>
-              <a:rPr lang="en-US" dirty="0"/>
-              <a:t>Conclusion</a:t>
+              <a:rPr lang="de-AT" dirty="0"/>
+              <a:t>Efficiency</a:t>
             </a:r>
           </a:p>
         </p:txBody>
@@ -6714,7 +6737,7 @@
           <p:cNvPr id="3" name="Content Placeholder 2">
             <a:extLst>
               <a:ext uri="{FF2B5EF4-FFF2-40B4-BE49-F238E27FC236}">
-                <a16:creationId xmlns:a16="http://schemas.microsoft.com/office/drawing/2014/main" id="{84CFF438-856F-957D-7156-C2F5B4AFDC20}"/>
+                <a16:creationId xmlns:a16="http://schemas.microsoft.com/office/drawing/2014/main" id="{C2C34ABA-A410-7029-1000-0F296A1EC0E5}"/>
               </a:ext>
             </a:extLst>
           </p:cNvPr>
@@ -6737,7 +6760,7 @@
     </p:spTree>
     <p:extLst>
       <p:ext uri="{BB962C8B-B14F-4D97-AF65-F5344CB8AC3E}">
-        <p14:creationId xmlns:p14="http://schemas.microsoft.com/office/powerpoint/2010/main" val="3637246051"/>
+        <p14:creationId xmlns:p14="http://schemas.microsoft.com/office/powerpoint/2010/main" val="1764173400"/>
       </p:ext>
     </p:extLst>
   </p:cSld>
@@ -6769,7 +6792,7 @@
           <p:cNvPr id="2" name="Title 1">
             <a:extLst>
               <a:ext uri="{FF2B5EF4-FFF2-40B4-BE49-F238E27FC236}">
-                <a16:creationId xmlns:a16="http://schemas.microsoft.com/office/drawing/2014/main" id="{F2828560-3281-7AA8-FACE-BE9A95FCF4EE}"/>
+                <a16:creationId xmlns:a16="http://schemas.microsoft.com/office/drawing/2014/main" id="{4D54CD70-A7C7-B159-DB36-DD35BB897E4A}"/>
               </a:ext>
             </a:extLst>
           </p:cNvPr>
@@ -6785,7 +6808,10 @@
           <a:bodyPr/>
           <a:lstStyle/>
           <a:p>
-            <a:endParaRPr lang="de-AT" dirty="0"/>
+            <a:r>
+              <a:rPr lang="en-US" dirty="0"/>
+              <a:t>Conclusion</a:t>
+            </a:r>
           </a:p>
         </p:txBody>
       </p:sp>
@@ -6794,7 +6820,7 @@
           <p:cNvPr id="3" name="Content Placeholder 2">
             <a:extLst>
               <a:ext uri="{FF2B5EF4-FFF2-40B4-BE49-F238E27FC236}">
-                <a16:creationId xmlns:a16="http://schemas.microsoft.com/office/drawing/2014/main" id="{C2C34ABA-A410-7029-1000-0F296A1EC0E5}"/>
+                <a16:creationId xmlns:a16="http://schemas.microsoft.com/office/drawing/2014/main" id="{84CFF438-856F-957D-7156-C2F5B4AFDC20}"/>
               </a:ext>
             </a:extLst>
           </p:cNvPr>
@@ -6817,7 +6843,7 @@
     </p:spTree>
     <p:extLst>
       <p:ext uri="{BB962C8B-B14F-4D97-AF65-F5344CB8AC3E}">
-        <p14:creationId xmlns:p14="http://schemas.microsoft.com/office/powerpoint/2010/main" val="1764173400"/>
+        <p14:creationId xmlns:p14="http://schemas.microsoft.com/office/powerpoint/2010/main" val="3637246051"/>
       </p:ext>
     </p:extLst>
   </p:cSld>
@@ -7089,7 +7115,7 @@
           <p:cNvPr id="2" name="Title 1">
             <a:extLst>
               <a:ext uri="{FF2B5EF4-FFF2-40B4-BE49-F238E27FC236}">
-                <a16:creationId xmlns:a16="http://schemas.microsoft.com/office/drawing/2014/main" id="{818E5137-9F21-7374-8AF7-83B95450444B}"/>
+                <a16:creationId xmlns:a16="http://schemas.microsoft.com/office/drawing/2014/main" id="{939E5666-F1C7-8D8F-D39D-C63D5A0AC930}"/>
               </a:ext>
             </a:extLst>
           </p:cNvPr>
@@ -7105,7 +7131,7 @@
           <a:bodyPr/>
           <a:lstStyle/>
           <a:p>
-            <a:endParaRPr lang="de-AT" dirty="0"/>
+            <a:endParaRPr lang="en-US"/>
           </a:p>
         </p:txBody>
       </p:sp>
@@ -7114,7 +7140,7 @@
           <p:cNvPr id="3" name="Content Placeholder 2">
             <a:extLst>
               <a:ext uri="{FF2B5EF4-FFF2-40B4-BE49-F238E27FC236}">
-                <a16:creationId xmlns:a16="http://schemas.microsoft.com/office/drawing/2014/main" id="{504F3F50-B242-B55C-903B-0FE55DB38A00}"/>
+                <a16:creationId xmlns:a16="http://schemas.microsoft.com/office/drawing/2014/main" id="{9A867062-5160-2B1A-950B-D0A63FD8017B}"/>
               </a:ext>
             </a:extLst>
           </p:cNvPr>
@@ -7130,14 +7156,14 @@
           <a:bodyPr/>
           <a:lstStyle/>
           <a:p>
-            <a:endParaRPr lang="de-AT" dirty="0"/>
+            <a:endParaRPr lang="en-US"/>
           </a:p>
         </p:txBody>
       </p:sp>
     </p:spTree>
     <p:extLst>
       <p:ext uri="{BB962C8B-B14F-4D97-AF65-F5344CB8AC3E}">
-        <p14:creationId xmlns:p14="http://schemas.microsoft.com/office/powerpoint/2010/main" val="2077306566"/>
+        <p14:creationId xmlns:p14="http://schemas.microsoft.com/office/powerpoint/2010/main" val="952875972"/>
       </p:ext>
     </p:extLst>
   </p:cSld>
@@ -7456,7 +7482,7 @@
 </file>
 
 <file path=ppt/slides/slide4.xml><?xml version="1.0" encoding="utf-8"?>
-<p:sld xmlns:a="http://schemas.openxmlformats.org/drawingml/2006/main" xmlns:r="http://schemas.openxmlformats.org/officeDocument/2006/relationships" xmlns:p="http://schemas.openxmlformats.org/presentationml/2006/main">
+<p:sld xmlns:a="http://schemas.openxmlformats.org/drawingml/2006/main" xmlns:r="http://schemas.openxmlformats.org/officeDocument/2006/relationships" xmlns:p="http://schemas.openxmlformats.org/presentationml/2006/main" show="0">
   <p:cSld>
     <p:spTree>
       <p:nvGrpSpPr>
@@ -7823,7 +7849,64 @@
           <a:bodyPr/>
           <a:lstStyle/>
           <a:p>
-            <a:endParaRPr lang="de-AT" dirty="0"/>
+            <a:r>
+              <a:rPr lang="en-US" dirty="0"/>
+              <a:t>We experimented with:</a:t>
+            </a:r>
+          </a:p>
+          <a:p>
+            <a:pPr lvl="1"/>
+            <a:r>
+              <a:rPr lang="en-US" dirty="0"/>
+              <a:t>Number of trees</a:t>
+            </a:r>
+          </a:p>
+          <a:p>
+            <a:pPr lvl="1"/>
+            <a:r>
+              <a:rPr lang="en-US" dirty="0"/>
+              <a:t>A maximum of features considered in a split</a:t>
+            </a:r>
+          </a:p>
+          <a:p>
+            <a:pPr lvl="1"/>
+            <a:r>
+              <a:rPr lang="en-US" dirty="0"/>
+              <a:t>Maximum tree depth</a:t>
+            </a:r>
+          </a:p>
+          <a:p>
+            <a:pPr lvl="1"/>
+            <a:r>
+              <a:rPr lang="en-US" dirty="0"/>
+              <a:t>A minimum of samples before a split</a:t>
+            </a:r>
+          </a:p>
+          <a:p>
+            <a:pPr lvl="1"/>
+            <a:r>
+              <a:rPr lang="en-US" dirty="0"/>
+              <a:t>A minimum of samples per leaf</a:t>
+            </a:r>
+          </a:p>
+          <a:p>
+            <a:pPr lvl="1"/>
+            <a:r>
+              <a:rPr lang="en-US" dirty="0"/>
+              <a:t>A maximum of leaf nodes</a:t>
+            </a:r>
+          </a:p>
+          <a:p>
+            <a:pPr lvl="1"/>
+            <a:r>
+              <a:rPr lang="en-US" dirty="0"/>
+              <a:t>?A maximum of samples </a:t>
+            </a:r>
+            <a:r>
+              <a:rPr lang="en-US"/>
+              <a:t>for each tree</a:t>
+            </a:r>
+            <a:endParaRPr lang="en-US" dirty="0"/>
           </a:p>
         </p:txBody>
       </p:sp>

</xml_diff>